<commit_message>
Slide cleanup before talk
</commit_message>
<xml_diff>
--- a/Xamarin/DaytonDevelopersGroup2013/Xamarin.pptx
+++ b/Xamarin/DaytonDevelopersGroup2013/Xamarin.pptx
@@ -5,30 +5,28 @@
     <p:sldMasterId id="2147483738" r:id="rId1"/>
   </p:sldMasterIdLst>
   <p:notesMasterIdLst>
-    <p:notesMasterId r:id="rId20"/>
+    <p:notesMasterId r:id="rId15"/>
   </p:notesMasterIdLst>
+  <p:handoutMasterIdLst>
+    <p:handoutMasterId r:id="rId16"/>
+  </p:handoutMasterIdLst>
   <p:sldIdLst>
     <p:sldId id="256" r:id="rId2"/>
     <p:sldId id="257" r:id="rId3"/>
     <p:sldId id="260" r:id="rId4"/>
     <p:sldId id="272" r:id="rId5"/>
-    <p:sldId id="265" r:id="rId6"/>
-    <p:sldId id="259" r:id="rId7"/>
-    <p:sldId id="261" r:id="rId8"/>
-    <p:sldId id="262" r:id="rId9"/>
-    <p:sldId id="266" r:id="rId10"/>
-    <p:sldId id="275" r:id="rId11"/>
-    <p:sldId id="279" r:id="rId12"/>
-    <p:sldId id="267" r:id="rId13"/>
-    <p:sldId id="273" r:id="rId14"/>
-    <p:sldId id="270" r:id="rId15"/>
-    <p:sldId id="278" r:id="rId16"/>
-    <p:sldId id="274" r:id="rId17"/>
-    <p:sldId id="271" r:id="rId18"/>
-    <p:sldId id="280" r:id="rId19"/>
+    <p:sldId id="266" r:id="rId6"/>
+    <p:sldId id="275" r:id="rId7"/>
+    <p:sldId id="281" r:id="rId8"/>
+    <p:sldId id="279" r:id="rId9"/>
+    <p:sldId id="273" r:id="rId10"/>
+    <p:sldId id="270" r:id="rId11"/>
+    <p:sldId id="274" r:id="rId12"/>
+    <p:sldId id="271" r:id="rId13"/>
+    <p:sldId id="280" r:id="rId14"/>
   </p:sldIdLst>
   <p:sldSz cx="9144000" cy="6858000" type="screen4x3"/>
-  <p:notesSz cx="6858000" cy="9144000"/>
+  <p:notesSz cx="7010400" cy="9296400"/>
   <p:defaultTextStyle>
     <a:defPPr>
       <a:defRPr lang="en-US"/>
@@ -143,6 +141,171 @@
 </p:presentation>
 </file>
 
+<file path=ppt/handoutMasters/handoutMaster1.xml><?xml version="1.0" encoding="utf-8"?>
+<p:handoutMaster xmlns:a="http://schemas.openxmlformats.org/drawingml/2006/main" xmlns:r="http://schemas.openxmlformats.org/officeDocument/2006/relationships" xmlns:p="http://schemas.openxmlformats.org/presentationml/2006/main">
+  <p:cSld>
+    <p:bg>
+      <p:bgRef idx="1001">
+        <a:schemeClr val="bg1"/>
+      </p:bgRef>
+    </p:bg>
+    <p:spTree>
+      <p:nvGrpSpPr>
+        <p:cNvPr id="1" name=""/>
+        <p:cNvGrpSpPr/>
+        <p:nvPr/>
+      </p:nvGrpSpPr>
+      <p:grpSpPr>
+        <a:xfrm>
+          <a:off x="0" y="0"/>
+          <a:ext cx="0" cy="0"/>
+          <a:chOff x="0" y="0"/>
+          <a:chExt cx="0" cy="0"/>
+        </a:xfrm>
+      </p:grpSpPr>
+      <p:sp>
+        <p:nvSpPr>
+          <p:cNvPr id="2" name="Header Placeholder 1"/>
+          <p:cNvSpPr>
+            <a:spLocks noGrp="1"/>
+          </p:cNvSpPr>
+          <p:nvPr>
+            <p:ph type="hdr" sz="quarter"/>
+          </p:nvPr>
+        </p:nvSpPr>
+        <p:spPr>
+          <a:xfrm>
+            <a:off x="0" y="0"/>
+            <a:ext cx="3037840" cy="466434"/>
+          </a:xfrm>
+          <a:prstGeom prst="rect">
+            <a:avLst/>
+          </a:prstGeom>
+        </p:spPr>
+        <p:txBody>
+          <a:bodyPr vert="horz" lIns="93177" tIns="46589" rIns="93177" bIns="46589" rtlCol="0"/>
+          <a:lstStyle>
+            <a:lvl1pPr algn="l">
+              <a:defRPr sz="1200"/>
+            </a:lvl1pPr>
+          </a:lstStyle>
+          <a:p>
+            <a:endParaRPr lang="en-US"/>
+          </a:p>
+        </p:txBody>
+      </p:sp>
+      <p:sp>
+        <p:nvSpPr>
+          <p:cNvPr id="3" name="Date Placeholder 2"/>
+          <p:cNvSpPr>
+            <a:spLocks noGrp="1"/>
+          </p:cNvSpPr>
+          <p:nvPr>
+            <p:ph type="dt" sz="quarter" idx="1"/>
+          </p:nvPr>
+        </p:nvSpPr>
+        <p:spPr>
+          <a:xfrm>
+            <a:off x="3970938" y="0"/>
+            <a:ext cx="3037840" cy="466434"/>
+          </a:xfrm>
+          <a:prstGeom prst="rect">
+            <a:avLst/>
+          </a:prstGeom>
+        </p:spPr>
+        <p:txBody>
+          <a:bodyPr vert="horz" lIns="93177" tIns="46589" rIns="93177" bIns="46589" rtlCol="0"/>
+          <a:lstStyle>
+            <a:lvl1pPr algn="r">
+              <a:defRPr sz="1200"/>
+            </a:lvl1pPr>
+          </a:lstStyle>
+          <a:p>
+            <a:fld id="{E0B90FF7-C732-4B49-B886-00BBC1145230}" type="datetimeFigureOut">
+              <a:rPr lang="en-US" smtClean="0"/>
+              <a:t>11/20/2013</a:t>
+            </a:fld>
+            <a:endParaRPr lang="en-US"/>
+          </a:p>
+        </p:txBody>
+      </p:sp>
+      <p:sp>
+        <p:nvSpPr>
+          <p:cNvPr id="4" name="Footer Placeholder 3"/>
+          <p:cNvSpPr>
+            <a:spLocks noGrp="1"/>
+          </p:cNvSpPr>
+          <p:nvPr>
+            <p:ph type="ftr" sz="quarter" idx="2"/>
+          </p:nvPr>
+        </p:nvSpPr>
+        <p:spPr>
+          <a:xfrm>
+            <a:off x="0" y="8829967"/>
+            <a:ext cx="3037840" cy="466433"/>
+          </a:xfrm>
+          <a:prstGeom prst="rect">
+            <a:avLst/>
+          </a:prstGeom>
+        </p:spPr>
+        <p:txBody>
+          <a:bodyPr vert="horz" lIns="93177" tIns="46589" rIns="93177" bIns="46589" rtlCol="0" anchor="b"/>
+          <a:lstStyle>
+            <a:lvl1pPr algn="l">
+              <a:defRPr sz="1200"/>
+            </a:lvl1pPr>
+          </a:lstStyle>
+          <a:p>
+            <a:endParaRPr lang="en-US"/>
+          </a:p>
+        </p:txBody>
+      </p:sp>
+      <p:sp>
+        <p:nvSpPr>
+          <p:cNvPr id="5" name="Slide Number Placeholder 4"/>
+          <p:cNvSpPr>
+            <a:spLocks noGrp="1"/>
+          </p:cNvSpPr>
+          <p:nvPr>
+            <p:ph type="sldNum" sz="quarter" idx="3"/>
+          </p:nvPr>
+        </p:nvSpPr>
+        <p:spPr>
+          <a:xfrm>
+            <a:off x="3970938" y="8829967"/>
+            <a:ext cx="3037840" cy="466433"/>
+          </a:xfrm>
+          <a:prstGeom prst="rect">
+            <a:avLst/>
+          </a:prstGeom>
+        </p:spPr>
+        <p:txBody>
+          <a:bodyPr vert="horz" lIns="93177" tIns="46589" rIns="93177" bIns="46589" rtlCol="0" anchor="b"/>
+          <a:lstStyle>
+            <a:lvl1pPr algn="r">
+              <a:defRPr sz="1200"/>
+            </a:lvl1pPr>
+          </a:lstStyle>
+          <a:p>
+            <a:fld id="{88E86AF3-B5B5-4832-9D10-28B2F305718D}" type="slidenum">
+              <a:rPr lang="en-US" smtClean="0"/>
+              <a:t>‹#›</a:t>
+            </a:fld>
+            <a:endParaRPr lang="en-US"/>
+          </a:p>
+        </p:txBody>
+      </p:sp>
+    </p:spTree>
+    <p:extLst>
+      <p:ext uri="{BB962C8B-B14F-4D97-AF65-F5344CB8AC3E}">
+        <p14:creationId xmlns:p14="http://schemas.microsoft.com/office/powerpoint/2010/main" val="4280060097"/>
+      </p:ext>
+    </p:extLst>
+  </p:cSld>
+  <p:clrMap bg1="lt1" tx1="dk1" bg2="lt2" tx2="dk2" accent1="accent1" accent2="accent2" accent3="accent3" accent4="accent4" accent5="accent5" accent6="accent6" hlink="hlink" folHlink="folHlink"/>
+</p:handoutMaster>
+</file>
+
 <file path=ppt/notesMasters/notesMaster1.xml><?xml version="1.0" encoding="utf-8"?>
 <p:notesMaster xmlns:a="http://schemas.openxmlformats.org/drawingml/2006/main" xmlns:r="http://schemas.openxmlformats.org/officeDocument/2006/relationships" xmlns:p="http://schemas.openxmlformats.org/presentationml/2006/main">
   <p:cSld>
@@ -178,14 +341,14 @@
         <p:spPr>
           <a:xfrm>
             <a:off x="0" y="0"/>
-            <a:ext cx="2971800" cy="457200"/>
+            <a:ext cx="3037840" cy="464820"/>
           </a:xfrm>
           <a:prstGeom prst="rect">
             <a:avLst/>
           </a:prstGeom>
         </p:spPr>
         <p:txBody>
-          <a:bodyPr vert="horz" lIns="91440" tIns="45720" rIns="91440" bIns="45720" rtlCol="0"/>
+          <a:bodyPr vert="horz" lIns="93177" tIns="46589" rIns="93177" bIns="46589" rtlCol="0"/>
           <a:lstStyle>
             <a:lvl1pPr algn="l">
               <a:defRPr sz="1200"/>
@@ -208,15 +371,15 @@
         </p:nvSpPr>
         <p:spPr>
           <a:xfrm>
-            <a:off x="3884613" y="0"/>
-            <a:ext cx="2971800" cy="457200"/>
+            <a:off x="3970938" y="0"/>
+            <a:ext cx="3037840" cy="464820"/>
           </a:xfrm>
           <a:prstGeom prst="rect">
             <a:avLst/>
           </a:prstGeom>
         </p:spPr>
         <p:txBody>
-          <a:bodyPr vert="horz" lIns="91440" tIns="45720" rIns="91440" bIns="45720" rtlCol="0"/>
+          <a:bodyPr vert="horz" lIns="93177" tIns="46589" rIns="93177" bIns="46589" rtlCol="0"/>
           <a:lstStyle>
             <a:lvl1pPr algn="r">
               <a:defRPr sz="1200"/>
@@ -244,8 +407,8 @@
         </p:nvSpPr>
         <p:spPr>
           <a:xfrm>
-            <a:off x="1143000" y="685800"/>
-            <a:ext cx="4572000" cy="3429000"/>
+            <a:off x="1181100" y="696913"/>
+            <a:ext cx="4648200" cy="3486150"/>
           </a:xfrm>
           <a:prstGeom prst="rect">
             <a:avLst/>
@@ -258,7 +421,7 @@
           </a:ln>
         </p:spPr>
         <p:txBody>
-          <a:bodyPr vert="horz" lIns="91440" tIns="45720" rIns="91440" bIns="45720" rtlCol="0" anchor="ctr"/>
+          <a:bodyPr vert="horz" lIns="93177" tIns="46589" rIns="93177" bIns="46589" rtlCol="0" anchor="ctr"/>
           <a:lstStyle/>
           <a:p>
             <a:endParaRPr lang="en-US"/>
@@ -277,15 +440,15 @@
         </p:nvSpPr>
         <p:spPr>
           <a:xfrm>
-            <a:off x="685800" y="4343400"/>
-            <a:ext cx="5486400" cy="4114800"/>
+            <a:off x="701040" y="4415790"/>
+            <a:ext cx="5608320" cy="4183380"/>
           </a:xfrm>
           <a:prstGeom prst="rect">
             <a:avLst/>
           </a:prstGeom>
         </p:spPr>
         <p:txBody>
-          <a:bodyPr vert="horz" lIns="91440" tIns="45720" rIns="91440" bIns="45720" rtlCol="0">
+          <a:bodyPr vert="horz" lIns="93177" tIns="46589" rIns="93177" bIns="46589" rtlCol="0">
             <a:normAutofit/>
           </a:bodyPr>
           <a:lstStyle/>
@@ -339,15 +502,15 @@
         </p:nvSpPr>
         <p:spPr>
           <a:xfrm>
-            <a:off x="0" y="8685213"/>
-            <a:ext cx="2971800" cy="457200"/>
+            <a:off x="0" y="8829967"/>
+            <a:ext cx="3037840" cy="464820"/>
           </a:xfrm>
           <a:prstGeom prst="rect">
             <a:avLst/>
           </a:prstGeom>
         </p:spPr>
         <p:txBody>
-          <a:bodyPr vert="horz" lIns="91440" tIns="45720" rIns="91440" bIns="45720" rtlCol="0" anchor="b"/>
+          <a:bodyPr vert="horz" lIns="93177" tIns="46589" rIns="93177" bIns="46589" rtlCol="0" anchor="b"/>
           <a:lstStyle>
             <a:lvl1pPr algn="l">
               <a:defRPr sz="1200"/>
@@ -370,15 +533,15 @@
         </p:nvSpPr>
         <p:spPr>
           <a:xfrm>
-            <a:off x="3884613" y="8685213"/>
-            <a:ext cx="2971800" cy="457200"/>
+            <a:off x="3970938" y="8829967"/>
+            <a:ext cx="3037840" cy="464820"/>
           </a:xfrm>
           <a:prstGeom prst="rect">
             <a:avLst/>
           </a:prstGeom>
         </p:spPr>
         <p:txBody>
-          <a:bodyPr vert="horz" lIns="91440" tIns="45720" rIns="91440" bIns="45720" rtlCol="0" anchor="b"/>
+          <a:bodyPr vert="horz" lIns="93177" tIns="46589" rIns="93177" bIns="46589" rtlCol="0" anchor="b"/>
           <a:lstStyle>
             <a:lvl1pPr algn="r">
               <a:defRPr sz="1200"/>
@@ -582,6 +745,122 @@
 </p:notes>
 </file>
 
+<file path=ppt/notesSlides/notesSlide10.xml><?xml version="1.0" encoding="utf-8"?>
+<p:notes xmlns:a="http://schemas.openxmlformats.org/drawingml/2006/main" xmlns:r="http://schemas.openxmlformats.org/officeDocument/2006/relationships" xmlns:p="http://schemas.openxmlformats.org/presentationml/2006/main">
+  <p:cSld>
+    <p:spTree>
+      <p:nvGrpSpPr>
+        <p:cNvPr id="1" name=""/>
+        <p:cNvGrpSpPr/>
+        <p:nvPr/>
+      </p:nvGrpSpPr>
+      <p:grpSpPr>
+        <a:xfrm>
+          <a:off x="0" y="0"/>
+          <a:ext cx="0" cy="0"/>
+          <a:chOff x="0" y="0"/>
+          <a:chExt cx="0" cy="0"/>
+        </a:xfrm>
+      </p:grpSpPr>
+      <p:sp>
+        <p:nvSpPr>
+          <p:cNvPr id="2" name="Slide Image Placeholder 1"/>
+          <p:cNvSpPr>
+            <a:spLocks noGrp="1" noRot="1" noChangeAspect="1"/>
+          </p:cNvSpPr>
+          <p:nvPr>
+            <p:ph type="sldImg"/>
+          </p:nvPr>
+        </p:nvSpPr>
+        <p:spPr/>
+      </p:sp>
+      <p:sp>
+        <p:nvSpPr>
+          <p:cNvPr id="3" name="Notes Placeholder 2"/>
+          <p:cNvSpPr>
+            <a:spLocks noGrp="1"/>
+          </p:cNvSpPr>
+          <p:nvPr>
+            <p:ph type="body" idx="1"/>
+          </p:nvPr>
+        </p:nvSpPr>
+        <p:spPr/>
+        <p:txBody>
+          <a:bodyPr>
+            <a:normAutofit/>
+          </a:bodyPr>
+          <a:lstStyle/>
+          <a:p>
+            <a:r>
+              <a:rPr lang="en-US" dirty="0" smtClean="0"/>
+              <a:t>Jamie: Well, there you have</a:t>
+            </a:r>
+            <a:r>
+              <a:rPr lang="en-US" baseline="0" dirty="0" smtClean="0"/>
+              <a:t> it – two very different tools for creating cross-platform mobile applications.  One leverages your web skills of HTML, CSS, and </a:t>
+            </a:r>
+            <a:r>
+              <a:rPr lang="en-US" baseline="0" dirty="0" err="1" smtClean="0"/>
+              <a:t>Javascript</a:t>
+            </a:r>
+            <a:r>
+              <a:rPr lang="en-US" baseline="0" dirty="0" smtClean="0"/>
+              <a:t>.  The other allows you a cleaner way to have a different user interface per platform, easily making your apps seem much more targeted per environment and therefore enhancing the user experience.</a:t>
+            </a:r>
+          </a:p>
+          <a:p>
+            <a:endParaRPr lang="en-US" baseline="0" dirty="0" smtClean="0"/>
+          </a:p>
+          <a:p>
+            <a:r>
+              <a:rPr lang="en-US" baseline="0" dirty="0" err="1" smtClean="0"/>
+              <a:t>Jerrel</a:t>
+            </a:r>
+            <a:r>
+              <a:rPr lang="en-US" baseline="0" dirty="0" smtClean="0"/>
+              <a:t>: And with that, your excuse to not write your mobile app is gone!</a:t>
+            </a:r>
+            <a:endParaRPr lang="en-US" dirty="0"/>
+          </a:p>
+        </p:txBody>
+      </p:sp>
+      <p:sp>
+        <p:nvSpPr>
+          <p:cNvPr id="4" name="Slide Number Placeholder 3"/>
+          <p:cNvSpPr>
+            <a:spLocks noGrp="1"/>
+          </p:cNvSpPr>
+          <p:nvPr>
+            <p:ph type="sldNum" sz="quarter" idx="10"/>
+          </p:nvPr>
+        </p:nvSpPr>
+        <p:spPr/>
+        <p:txBody>
+          <a:bodyPr/>
+          <a:lstStyle/>
+          <a:p>
+            <a:fld id="{B9DFB3AD-BC26-4EB1-9A72-FD37058C7E87}" type="slidenum">
+              <a:rPr lang="en-US" smtClean="0"/>
+              <a:pPr/>
+              <a:t>10</a:t>
+            </a:fld>
+            <a:endParaRPr lang="en-US"/>
+          </a:p>
+        </p:txBody>
+      </p:sp>
+    </p:spTree>
+    <p:extLst>
+      <p:ext uri="{BB962C8B-B14F-4D97-AF65-F5344CB8AC3E}">
+        <p14:creationId xmlns:p14="http://schemas.microsoft.com/office/powerpoint/2010/main" val="1688177331"/>
+      </p:ext>
+    </p:extLst>
+  </p:cSld>
+  <p:clrMapOvr>
+    <a:masterClrMapping/>
+  </p:clrMapOvr>
+</p:notes>
+</file>
+
 <file path=ppt/notesSlides/notesSlide2.xml><?xml version="1.0" encoding="utf-8"?>
 <p:notes xmlns:a="http://schemas.openxmlformats.org/drawingml/2006/main" xmlns:r="http://schemas.openxmlformats.org/officeDocument/2006/relationships" xmlns:p="http://schemas.openxmlformats.org/presentationml/2006/main">
   <p:cSld>
@@ -882,12 +1161,10 @@
         </p:nvSpPr>
         <p:spPr/>
         <p:txBody>
-          <a:bodyPr>
-            <a:normAutofit/>
-          </a:bodyPr>
-          <a:lstStyle/>
-          <a:p>
-            <a:endParaRPr lang="en-US" dirty="0"/>
+          <a:bodyPr/>
+          <a:lstStyle/>
+          <a:p>
+            <a:endParaRPr lang="en-US"/>
           </a:p>
         </p:txBody>
       </p:sp>
@@ -909,7 +1186,7 @@
             <a:fld id="{B9DFB3AD-BC26-4EB1-9A72-FD37058C7E87}" type="slidenum">
               <a:rPr lang="en-US" smtClean="0"/>
               <a:pPr/>
-              <a:t>6</a:t>
+              <a:t>5</a:t>
             </a:fld>
             <a:endParaRPr lang="en-US"/>
           </a:p>
@@ -918,7 +1195,7 @@
     </p:spTree>
     <p:extLst>
       <p:ext uri="{BB962C8B-B14F-4D97-AF65-F5344CB8AC3E}">
-        <p14:creationId xmlns:p14="http://schemas.microsoft.com/office/powerpoint/2010/main" val="3078225192"/>
+        <p14:creationId xmlns:p14="http://schemas.microsoft.com/office/powerpoint/2010/main" val="564162449"/>
       </p:ext>
     </p:extLst>
   </p:cSld>
@@ -969,12 +1246,117 @@
         </p:nvSpPr>
         <p:spPr/>
         <p:txBody>
-          <a:bodyPr>
-            <a:normAutofit/>
-          </a:bodyPr>
-          <a:lstStyle/>
-          <a:p>
-            <a:endParaRPr lang="en-US" dirty="0"/>
+          <a:bodyPr/>
+          <a:lstStyle/>
+          <a:p>
+            <a:pPr lvl="0"/>
+            <a:r>
+              <a:rPr lang="en-US" dirty="0" err="1"/>
+              <a:t>Xamarin</a:t>
+            </a:r>
+            <a:r>
+              <a:rPr lang="en-US" dirty="0"/>
+              <a:t> contains a fully functional implementation of the .NET runtime, called Mono, which is bundled with your app so that your code executes with all of the power of C# and .NET, including memory management, reflection, and the .NET base class libraries</a:t>
+            </a:r>
+            <a:endParaRPr lang="en-US" dirty="0" smtClean="0"/>
+          </a:p>
+          <a:p>
+            <a:pPr lvl="0"/>
+            <a:endParaRPr lang="en-US" dirty="0" smtClean="0"/>
+          </a:p>
+          <a:p>
+            <a:pPr lvl="0"/>
+            <a:r>
+              <a:rPr lang="en-US" dirty="0" err="1" smtClean="0"/>
+              <a:t>iOS</a:t>
+            </a:r>
+            <a:r>
+              <a:rPr lang="en-US" dirty="0" smtClean="0"/>
+              <a:t> </a:t>
+            </a:r>
+            <a:r>
+              <a:rPr lang="en-US" dirty="0" smtClean="0"/>
+              <a:t>requires network connection to Mac</a:t>
+            </a:r>
+          </a:p>
+          <a:p>
+            <a:pPr lvl="0"/>
+            <a:endParaRPr lang="en-US" dirty="0" smtClean="0"/>
+          </a:p>
+          <a:p>
+            <a:r>
+              <a:rPr lang="en-US" dirty="0" err="1"/>
+              <a:t>Xamarin's</a:t>
+            </a:r>
+            <a:r>
+              <a:rPr lang="en-US" dirty="0"/>
+              <a:t> binding technology exposes all of the APIs available in </a:t>
+            </a:r>
+            <a:r>
+              <a:rPr lang="en-US" dirty="0" err="1"/>
+              <a:t>iOS</a:t>
+            </a:r>
+            <a:r>
+              <a:rPr lang="en-US" dirty="0"/>
+              <a:t> and Android to your applications as regular C# class libraries.</a:t>
+            </a:r>
+          </a:p>
+          <a:p>
+            <a:r>
+              <a:rPr lang="en-US" dirty="0"/>
+              <a:t>This means your </a:t>
+            </a:r>
+            <a:r>
+              <a:rPr lang="en-US" dirty="0" err="1"/>
+              <a:t>Xamarin</a:t>
+            </a:r>
+            <a:r>
+              <a:rPr lang="en-US" dirty="0"/>
+              <a:t> application can do anything a platform, or device, offers, with native user interface and excellent performance.</a:t>
+            </a:r>
+          </a:p>
+          <a:p>
+            <a:pPr lvl="0"/>
+            <a:endParaRPr lang="en-US" dirty="0" smtClean="0"/>
+          </a:p>
+          <a:p>
+            <a:pPr defTabSz="931774">
+              <a:defRPr/>
+            </a:pPr>
+            <a:r>
+              <a:rPr lang="en-US" dirty="0" err="1"/>
+              <a:t>Xamarin</a:t>
+            </a:r>
+            <a:r>
+              <a:rPr lang="en-US" dirty="0"/>
+              <a:t> compiles your app to a native binary, not cross-compiled, and not interpreted. </a:t>
+            </a:r>
+            <a:endParaRPr lang="en-US" dirty="0" smtClean="0"/>
+          </a:p>
+          <a:p>
+            <a:pPr defTabSz="931774">
+              <a:defRPr/>
+            </a:pPr>
+            <a:endParaRPr lang="en-US" dirty="0" smtClean="0"/>
+          </a:p>
+          <a:p>
+            <a:pPr defTabSz="931774">
+              <a:defRPr/>
+            </a:pPr>
+            <a:r>
+              <a:rPr lang="en-US" dirty="0" smtClean="0"/>
+              <a:t>Visual Studio Integration </a:t>
+            </a:r>
+          </a:p>
+          <a:p>
+            <a:pPr defTabSz="931774">
+              <a:defRPr/>
+            </a:pPr>
+            <a:endParaRPr lang="en-US" dirty="0" smtClean="0"/>
+          </a:p>
+          <a:p>
+            <a:pPr lvl="0"/>
+            <a:endParaRPr lang="en-US" dirty="0" smtClean="0"/>
           </a:p>
         </p:txBody>
       </p:sp>
@@ -996,7 +1378,7 @@
             <a:fld id="{B9DFB3AD-BC26-4EB1-9A72-FD37058C7E87}" type="slidenum">
               <a:rPr lang="en-US" smtClean="0"/>
               <a:pPr/>
-              <a:t>7</a:t>
+              <a:t>6</a:t>
             </a:fld>
             <a:endParaRPr lang="en-US"/>
           </a:p>
@@ -1005,7 +1387,7 @@
     </p:spTree>
     <p:extLst>
       <p:ext uri="{BB962C8B-B14F-4D97-AF65-F5344CB8AC3E}">
-        <p14:creationId xmlns:p14="http://schemas.microsoft.com/office/powerpoint/2010/main" val="3095546884"/>
+        <p14:creationId xmlns:p14="http://schemas.microsoft.com/office/powerpoint/2010/main" val="4113876280"/>
       </p:ext>
     </p:extLst>
   </p:cSld>
@@ -1059,269 +1441,68 @@
           <a:bodyPr/>
           <a:lstStyle/>
           <a:p>
-            <a:pPr lvl="0"/>
-            <a:r>
-              <a:rPr lang="en-US" sz="1200" b="0" i="0" kern="1200" dirty="0" err="1" smtClean="0">
-                <a:solidFill>
-                  <a:schemeClr val="tx1"/>
-                </a:solidFill>
-                <a:effectLst/>
-                <a:latin typeface="+mn-lt"/>
-                <a:ea typeface="+mn-ea"/>
-                <a:cs typeface="+mn-cs"/>
-              </a:rPr>
-              <a:t>Xamarin</a:t>
-            </a:r>
-            <a:r>
-              <a:rPr lang="en-US" sz="1200" b="0" i="0" kern="1200" dirty="0" smtClean="0">
-                <a:solidFill>
-                  <a:schemeClr val="tx1"/>
-                </a:solidFill>
-                <a:effectLst/>
-                <a:latin typeface="+mn-lt"/>
-                <a:ea typeface="+mn-ea"/>
-                <a:cs typeface="+mn-cs"/>
-              </a:rPr>
-              <a:t> contains a fully functional implementation of the .NET runtime, called Mono, which is bundled with your app so that your code executes with all of the power of C# and .NET, including memory management, reflection, and the .NET base class libraries</a:t>
-            </a:r>
+            <a:r>
+              <a:rPr lang="en-US" dirty="0" smtClean="0"/>
+              <a:t>Components:</a:t>
+            </a:r>
+          </a:p>
+          <a:p>
             <a:endParaRPr lang="en-US" dirty="0" smtClean="0"/>
           </a:p>
           <a:p>
-            <a:pPr lvl="0"/>
-            <a:endParaRPr lang="en-US" dirty="0" smtClean="0"/>
-          </a:p>
-          <a:p>
-            <a:pPr lvl="0"/>
             <a:r>
               <a:rPr lang="en-US" dirty="0" smtClean="0"/>
-              <a:t>Can develop Android and </a:t>
-            </a:r>
-            <a:r>
-              <a:rPr lang="en-US" dirty="0" err="1" smtClean="0"/>
-              <a:t>iOS</a:t>
-            </a:r>
-            <a:r>
-              <a:rPr lang="en-US" dirty="0" smtClean="0"/>
-              <a:t> apps</a:t>
-            </a:r>
-          </a:p>
-          <a:p>
-            <a:pPr lvl="0"/>
-            <a:r>
-              <a:rPr lang="en-US" dirty="0" err="1" smtClean="0"/>
-              <a:t>iOS</a:t>
-            </a:r>
-            <a:r>
-              <a:rPr lang="en-US" dirty="0" smtClean="0"/>
-              <a:t> requires network connection to Mac</a:t>
-            </a:r>
-          </a:p>
-          <a:p>
-            <a:pPr lvl="0"/>
-            <a:endParaRPr lang="en-US" dirty="0" smtClean="0"/>
-          </a:p>
-          <a:p>
-            <a:r>
-              <a:rPr lang="en-US" sz="1200" b="0" i="0" kern="1200" dirty="0" err="1" smtClean="0">
-                <a:solidFill>
-                  <a:schemeClr val="tx1"/>
-                </a:solidFill>
-                <a:effectLst/>
-                <a:latin typeface="+mn-lt"/>
-                <a:ea typeface="+mn-ea"/>
-                <a:cs typeface="+mn-cs"/>
-              </a:rPr>
-              <a:t>Xamarin's</a:t>
-            </a:r>
-            <a:r>
-              <a:rPr lang="en-US" sz="1200" b="0" i="0" kern="1200" dirty="0" smtClean="0">
-                <a:solidFill>
-                  <a:schemeClr val="tx1"/>
-                </a:solidFill>
-                <a:effectLst/>
-                <a:latin typeface="+mn-lt"/>
-                <a:ea typeface="+mn-ea"/>
-                <a:cs typeface="+mn-cs"/>
-              </a:rPr>
-              <a:t> binding technology exposes all of the APIs available in </a:t>
-            </a:r>
-            <a:r>
-              <a:rPr lang="en-US" sz="1200" b="0" i="0" kern="1200" dirty="0" err="1" smtClean="0">
-                <a:solidFill>
-                  <a:schemeClr val="tx1"/>
-                </a:solidFill>
-                <a:effectLst/>
-                <a:latin typeface="+mn-lt"/>
-                <a:ea typeface="+mn-ea"/>
-                <a:cs typeface="+mn-cs"/>
-              </a:rPr>
-              <a:t>iOS</a:t>
-            </a:r>
-            <a:r>
-              <a:rPr lang="en-US" sz="1200" b="0" i="0" kern="1200" dirty="0" smtClean="0">
-                <a:solidFill>
-                  <a:schemeClr val="tx1"/>
-                </a:solidFill>
-                <a:effectLst/>
-                <a:latin typeface="+mn-lt"/>
-                <a:ea typeface="+mn-ea"/>
-                <a:cs typeface="+mn-cs"/>
-              </a:rPr>
-              <a:t> and Android to your applications as regular C# class libraries.</a:t>
-            </a:r>
-          </a:p>
-          <a:p>
-            <a:r>
-              <a:rPr lang="en-US" sz="1200" b="0" i="0" kern="1200" dirty="0" smtClean="0">
-                <a:solidFill>
-                  <a:schemeClr val="tx1"/>
-                </a:solidFill>
-                <a:effectLst/>
-                <a:latin typeface="+mn-lt"/>
-                <a:ea typeface="+mn-ea"/>
-                <a:cs typeface="+mn-cs"/>
-              </a:rPr>
-              <a:t>This means your </a:t>
-            </a:r>
-            <a:r>
-              <a:rPr lang="en-US" sz="1200" b="0" i="0" kern="1200" dirty="0" err="1" smtClean="0">
-                <a:solidFill>
-                  <a:schemeClr val="tx1"/>
-                </a:solidFill>
-                <a:effectLst/>
-                <a:latin typeface="+mn-lt"/>
-                <a:ea typeface="+mn-ea"/>
-                <a:cs typeface="+mn-cs"/>
-              </a:rPr>
-              <a:t>Xamarin</a:t>
-            </a:r>
-            <a:r>
-              <a:rPr lang="en-US" sz="1200" b="0" i="0" kern="1200" dirty="0" smtClean="0">
-                <a:solidFill>
-                  <a:schemeClr val="tx1"/>
-                </a:solidFill>
-                <a:effectLst/>
-                <a:latin typeface="+mn-lt"/>
-                <a:ea typeface="+mn-ea"/>
-                <a:cs typeface="+mn-cs"/>
-              </a:rPr>
-              <a:t> application can do anything a platform, or device, offers, with native user interface and excellent performance.</a:t>
-            </a:r>
-          </a:p>
-          <a:p>
-            <a:pPr lvl="0"/>
-            <a:endParaRPr lang="en-US" dirty="0" smtClean="0"/>
-          </a:p>
-          <a:p>
-            <a:pPr marL="0" marR="0" lvl="0" indent="0" algn="l" defTabSz="914400" rtl="0" eaLnBrk="1" fontAlgn="auto" latinLnBrk="0" hangingPunct="1">
-              <a:lnSpc>
-                <a:spcPct val="100000"/>
-              </a:lnSpc>
-              <a:spcBef>
-                <a:spcPts val="0"/>
-              </a:spcBef>
-              <a:spcAft>
-                <a:spcPts val="0"/>
-              </a:spcAft>
-              <a:buClrTx/>
-              <a:buSzTx/>
-              <a:buFontTx/>
-              <a:buNone/>
-              <a:tabLst/>
-              <a:defRPr/>
-            </a:pPr>
-            <a:r>
-              <a:rPr lang="en-US" sz="1200" b="0" i="0" kern="1200" dirty="0" err="1" smtClean="0">
-                <a:solidFill>
-                  <a:schemeClr val="tx1"/>
-                </a:solidFill>
-                <a:effectLst/>
-                <a:latin typeface="+mn-lt"/>
-                <a:ea typeface="+mn-ea"/>
-                <a:cs typeface="+mn-cs"/>
-              </a:rPr>
-              <a:t>Xamarin</a:t>
-            </a:r>
-            <a:r>
-              <a:rPr lang="en-US" sz="1200" b="0" i="0" kern="1200" smtClean="0">
-                <a:solidFill>
-                  <a:schemeClr val="tx1"/>
-                </a:solidFill>
-                <a:effectLst/>
-                <a:latin typeface="+mn-lt"/>
-                <a:ea typeface="+mn-ea"/>
-                <a:cs typeface="+mn-cs"/>
-              </a:rPr>
-              <a:t> compiles your app to a native binary, not cross-compiled, and not interpreted. </a:t>
-            </a:r>
-            <a:endParaRPr lang="en-US" dirty="0" smtClean="0"/>
-          </a:p>
-          <a:p>
-            <a:pPr marL="0" marR="0" lvl="0" indent="0" algn="l" defTabSz="914400" rtl="0" eaLnBrk="1" fontAlgn="auto" latinLnBrk="0" hangingPunct="1">
-              <a:lnSpc>
-                <a:spcPct val="100000"/>
-              </a:lnSpc>
-              <a:spcBef>
-                <a:spcPts val="0"/>
-              </a:spcBef>
-              <a:spcAft>
-                <a:spcPts val="0"/>
-              </a:spcAft>
-              <a:buClrTx/>
-              <a:buSzTx/>
-              <a:buFontTx/>
-              <a:buNone/>
-              <a:tabLst/>
-              <a:defRPr/>
-            </a:pPr>
-            <a:endParaRPr lang="en-US" dirty="0" smtClean="0"/>
-          </a:p>
-          <a:p>
-            <a:pPr marL="0" marR="0" lvl="0" indent="0" algn="l" defTabSz="914400" rtl="0" eaLnBrk="1" fontAlgn="auto" latinLnBrk="0" hangingPunct="1">
-              <a:lnSpc>
-                <a:spcPct val="100000"/>
-              </a:lnSpc>
-              <a:spcBef>
-                <a:spcPts val="0"/>
-              </a:spcBef>
-              <a:spcAft>
-                <a:spcPts val="0"/>
-              </a:spcAft>
-              <a:buClrTx/>
-              <a:buSzTx/>
-              <a:buFontTx/>
-              <a:buNone/>
-              <a:tabLst/>
-              <a:defRPr/>
-            </a:pPr>
-            <a:r>
-              <a:rPr lang="en-US" dirty="0" smtClean="0"/>
-              <a:t>Visual Studio Integration </a:t>
-            </a:r>
-          </a:p>
-          <a:p>
-            <a:pPr marL="0" marR="0" lvl="0" indent="0" algn="l" defTabSz="914400" rtl="0" eaLnBrk="1" fontAlgn="auto" latinLnBrk="0" hangingPunct="1">
-              <a:lnSpc>
-                <a:spcPct val="100000"/>
-              </a:lnSpc>
-              <a:spcBef>
-                <a:spcPts val="0"/>
-              </a:spcBef>
-              <a:spcAft>
-                <a:spcPts val="0"/>
-              </a:spcAft>
-              <a:buClrTx/>
-              <a:buSzTx/>
-              <a:buFontTx/>
-              <a:buNone/>
-              <a:tabLst/>
-              <a:defRPr/>
-            </a:pPr>
-            <a:endParaRPr lang="en-US" dirty="0" smtClean="0"/>
-          </a:p>
-          <a:p>
-            <a:pPr lvl="0"/>
-            <a:endParaRPr lang="en-US" dirty="0" smtClean="0"/>
+              <a:t>Azure mobile</a:t>
+            </a:r>
+            <a:r>
+              <a:rPr lang="en-US" baseline="0" dirty="0" smtClean="0"/>
+              <a:t> Services</a:t>
+            </a:r>
+          </a:p>
+          <a:p>
+            <a:r>
+              <a:rPr lang="en-US" baseline="0" dirty="0" err="1" smtClean="0"/>
+              <a:t>DropBox</a:t>
+            </a:r>
+            <a:r>
+              <a:rPr lang="en-US" baseline="0" dirty="0" smtClean="0"/>
+              <a:t> Sync (Apple)</a:t>
+            </a:r>
+          </a:p>
+          <a:p>
+            <a:r>
+              <a:rPr lang="en-US" baseline="0" dirty="0" smtClean="0"/>
+              <a:t>Facebook SDK</a:t>
+            </a:r>
+          </a:p>
+          <a:p>
+            <a:r>
+              <a:rPr lang="en-US" baseline="0" dirty="0" err="1" smtClean="0"/>
+              <a:t>CoverFlowView</a:t>
+            </a:r>
+            <a:r>
+              <a:rPr lang="en-US" baseline="0" dirty="0" smtClean="0"/>
+              <a:t> – Add </a:t>
+            </a:r>
+            <a:r>
+              <a:rPr lang="en-US" baseline="0" dirty="0" err="1" smtClean="0"/>
+              <a:t>CoverFlow</a:t>
+            </a:r>
+            <a:r>
+              <a:rPr lang="en-US" baseline="0" dirty="0" smtClean="0"/>
+              <a:t> to your app (apple)</a:t>
+            </a:r>
+          </a:p>
+          <a:p>
+            <a:r>
+              <a:rPr lang="en-US" baseline="0" dirty="0" err="1" smtClean="0"/>
+              <a:t>RestSharp</a:t>
+            </a:r>
+            <a:r>
+              <a:rPr lang="en-US" baseline="0" dirty="0" smtClean="0"/>
+              <a:t> – Simple REST Client</a:t>
+            </a:r>
+            <a:endParaRPr lang="en-US" dirty="0"/>
           </a:p>
         </p:txBody>
       </p:sp>
@@ -1343,7 +1524,7 @@
             <a:fld id="{B9DFB3AD-BC26-4EB1-9A72-FD37058C7E87}" type="slidenum">
               <a:rPr lang="en-US" smtClean="0"/>
               <a:pPr/>
-              <a:t>10</a:t>
+              <a:t>7</a:t>
             </a:fld>
             <a:endParaRPr lang="en-US"/>
           </a:p>
@@ -1352,7 +1533,7 @@
     </p:spTree>
     <p:extLst>
       <p:ext uri="{BB962C8B-B14F-4D97-AF65-F5344CB8AC3E}">
-        <p14:creationId xmlns:p14="http://schemas.microsoft.com/office/powerpoint/2010/main" val="4113876280"/>
+        <p14:creationId xmlns:p14="http://schemas.microsoft.com/office/powerpoint/2010/main" val="2529147777"/>
       </p:ext>
     </p:extLst>
   </p:cSld>
@@ -1403,12 +1584,10 @@
         </p:nvSpPr>
         <p:spPr/>
         <p:txBody>
-          <a:bodyPr>
-            <a:normAutofit/>
-          </a:bodyPr>
-          <a:lstStyle/>
-          <a:p>
-            <a:endParaRPr lang="en-US" baseline="0" dirty="0" smtClean="0"/>
+          <a:bodyPr/>
+          <a:lstStyle/>
+          <a:p>
+            <a:endParaRPr lang="en-US"/>
           </a:p>
         </p:txBody>
       </p:sp>
@@ -1430,7 +1609,7 @@
             <a:fld id="{B9DFB3AD-BC26-4EB1-9A72-FD37058C7E87}" type="slidenum">
               <a:rPr lang="en-US" smtClean="0"/>
               <a:pPr/>
-              <a:t>12</a:t>
+              <a:t>8</a:t>
             </a:fld>
             <a:endParaRPr lang="en-US"/>
           </a:p>
@@ -1439,7 +1618,7 @@
     </p:spTree>
     <p:extLst>
       <p:ext uri="{BB962C8B-B14F-4D97-AF65-F5344CB8AC3E}">
-        <p14:creationId xmlns:p14="http://schemas.microsoft.com/office/powerpoint/2010/main" val="3915659578"/>
+        <p14:creationId xmlns:p14="http://schemas.microsoft.com/office/powerpoint/2010/main" val="1764589224"/>
       </p:ext>
     </p:extLst>
   </p:cSld>
@@ -1490,41 +1669,10 @@
         </p:nvSpPr>
         <p:spPr/>
         <p:txBody>
-          <a:bodyPr>
-            <a:normAutofit/>
-          </a:bodyPr>
-          <a:lstStyle/>
-          <a:p>
-            <a:r>
-              <a:rPr lang="en-US" dirty="0" smtClean="0"/>
-              <a:t>Jamie: Well, there you have</a:t>
-            </a:r>
-            <a:r>
-              <a:rPr lang="en-US" baseline="0" dirty="0" smtClean="0"/>
-              <a:t> it – two very different tools for creating cross-platform mobile applications.  One leverages your web skills of HTML, CSS, and </a:t>
-            </a:r>
-            <a:r>
-              <a:rPr lang="en-US" baseline="0" dirty="0" err="1" smtClean="0"/>
-              <a:t>Javascript</a:t>
-            </a:r>
-            <a:r>
-              <a:rPr lang="en-US" baseline="0" dirty="0" smtClean="0"/>
-              <a:t>.  The other allows you a cleaner way to have a different user interface per platform, easily making your apps seem much more targeted per environment and therefore enhancing the user experience.</a:t>
-            </a:r>
-          </a:p>
-          <a:p>
-            <a:endParaRPr lang="en-US" baseline="0" dirty="0" smtClean="0"/>
-          </a:p>
-          <a:p>
-            <a:r>
-              <a:rPr lang="en-US" baseline="0" dirty="0" err="1" smtClean="0"/>
-              <a:t>Jerrel</a:t>
-            </a:r>
-            <a:r>
-              <a:rPr lang="en-US" baseline="0" dirty="0" smtClean="0"/>
-              <a:t>: And with that, your excuse to not write your mobile app is gone!</a:t>
-            </a:r>
-            <a:endParaRPr lang="en-US" dirty="0"/>
+          <a:bodyPr/>
+          <a:lstStyle/>
+          <a:p>
+            <a:endParaRPr lang="en-US"/>
           </a:p>
         </p:txBody>
       </p:sp>
@@ -1546,7 +1694,7 @@
             <a:fld id="{B9DFB3AD-BC26-4EB1-9A72-FD37058C7E87}" type="slidenum">
               <a:rPr lang="en-US" smtClean="0"/>
               <a:pPr/>
-              <a:t>14</a:t>
+              <a:t>9</a:t>
             </a:fld>
             <a:endParaRPr lang="en-US"/>
           </a:p>
@@ -1555,7 +1703,7 @@
     </p:spTree>
     <p:extLst>
       <p:ext uri="{BB962C8B-B14F-4D97-AF65-F5344CB8AC3E}">
-        <p14:creationId xmlns:p14="http://schemas.microsoft.com/office/powerpoint/2010/main" val="1688177331"/>
+        <p14:creationId xmlns:p14="http://schemas.microsoft.com/office/powerpoint/2010/main" val="4200488927"/>
       </p:ext>
     </p:extLst>
   </p:cSld>
@@ -7385,11 +7533,7 @@
             <a:pPr algn="ctr"/>
             <a:r>
               <a:rPr lang="en-US" dirty="0" smtClean="0"/>
-              <a:t>Jerrel </a:t>
-            </a:r>
-            <a:r>
-              <a:rPr lang="en-US" dirty="0" smtClean="0"/>
-              <a:t>Blankenship</a:t>
+              <a:t>Jerrel Blankenship</a:t>
             </a:r>
           </a:p>
           <a:p>
@@ -7410,7 +7554,6 @@
               <a:rPr lang="en-US" dirty="0" smtClean="0"/>
               <a:t>November 20, 2013</a:t>
             </a:r>
-            <a:endParaRPr lang="en-US" dirty="0" smtClean="0"/>
           </a:p>
         </p:txBody>
       </p:sp>
@@ -7448,6 +7591,63 @@
       </p:grpSpPr>
       <p:sp>
         <p:nvSpPr>
+          <p:cNvPr id="5" name="Title 4"/>
+          <p:cNvSpPr>
+            <a:spLocks noGrp="1"/>
+          </p:cNvSpPr>
+          <p:nvPr>
+            <p:ph type="ctrTitle"/>
+          </p:nvPr>
+        </p:nvSpPr>
+        <p:spPr/>
+        <p:txBody>
+          <a:bodyPr>
+            <a:normAutofit/>
+          </a:bodyPr>
+          <a:lstStyle/>
+          <a:p>
+            <a:r>
+              <a:rPr lang="en-US" sz="6600" dirty="0" smtClean="0"/>
+              <a:t>Questions?</a:t>
+            </a:r>
+            <a:endParaRPr lang="en-US" sz="6600" dirty="0"/>
+          </a:p>
+        </p:txBody>
+      </p:sp>
+    </p:spTree>
+  </p:cSld>
+  <p:clrMapOvr>
+    <a:masterClrMapping/>
+  </p:clrMapOvr>
+  <p:timing>
+    <p:tnLst>
+      <p:par>
+        <p:cTn id="1" dur="indefinite" restart="never" nodeType="tmRoot"/>
+      </p:par>
+    </p:tnLst>
+  </p:timing>
+</p:sld>
+</file>
+
+<file path=ppt/slides/slide11.xml><?xml version="1.0" encoding="utf-8"?>
+<p:sld xmlns:a="http://schemas.openxmlformats.org/drawingml/2006/main" xmlns:r="http://schemas.openxmlformats.org/officeDocument/2006/relationships" xmlns:p="http://schemas.openxmlformats.org/presentationml/2006/main">
+  <p:cSld>
+    <p:spTree>
+      <p:nvGrpSpPr>
+        <p:cNvPr id="1" name=""/>
+        <p:cNvGrpSpPr/>
+        <p:nvPr/>
+      </p:nvGrpSpPr>
+      <p:grpSpPr>
+        <a:xfrm>
+          <a:off x="0" y="0"/>
+          <a:ext cx="0" cy="0"/>
+          <a:chOff x="0" y="0"/>
+          <a:chExt cx="0" cy="0"/>
+        </a:xfrm>
+      </p:grpSpPr>
+      <p:sp>
+        <p:nvSpPr>
           <p:cNvPr id="2" name="Title 1"/>
           <p:cNvSpPr>
             <a:spLocks noGrp="1"/>
@@ -7456,42 +7656,968 @@
             <p:ph type="title"/>
           </p:nvPr>
         </p:nvSpPr>
+        <p:spPr>
+          <a:xfrm>
+            <a:off x="457200" y="609600"/>
+            <a:ext cx="7772400" cy="1456267"/>
+          </a:xfrm>
+        </p:spPr>
+        <p:txBody>
+          <a:bodyPr>
+            <a:normAutofit/>
+          </a:bodyPr>
+          <a:lstStyle/>
+          <a:p>
+            <a:pPr algn="ctr"/>
+            <a:r>
+              <a:rPr lang="en-US" sz="4000" dirty="0" smtClean="0"/>
+              <a:t>Contact </a:t>
+            </a:r>
+            <a:r>
+              <a:rPr lang="en-US" sz="4000" dirty="0" smtClean="0"/>
+              <a:t>Me</a:t>
+            </a:r>
+            <a:endParaRPr lang="en-US" sz="4000" dirty="0"/>
+          </a:p>
+        </p:txBody>
+      </p:sp>
+      <p:sp>
+        <p:nvSpPr>
+          <p:cNvPr id="6" name="Content Placeholder 5"/>
+          <p:cNvSpPr>
+            <a:spLocks noGrp="1"/>
+          </p:cNvSpPr>
+          <p:nvPr>
+            <p:ph sz="half" idx="1"/>
+          </p:nvPr>
+        </p:nvSpPr>
+        <p:spPr>
+          <a:xfrm>
+            <a:off x="2324100" y="2065867"/>
+            <a:ext cx="4038600" cy="2743200"/>
+          </a:xfrm>
+        </p:spPr>
+        <p:txBody>
+          <a:bodyPr>
+            <a:normAutofit/>
+          </a:bodyPr>
+          <a:lstStyle/>
+          <a:p>
+            <a:pPr algn="ctr">
+              <a:buNone/>
+            </a:pPr>
+            <a:r>
+              <a:rPr lang="en-US" sz="2400" dirty="0" smtClean="0"/>
+              <a:t>Jerrel@jerrelblankenship.com</a:t>
+            </a:r>
+            <a:endParaRPr lang="en-US" sz="2400" dirty="0" smtClean="0"/>
+          </a:p>
+          <a:p>
+            <a:pPr algn="ctr">
+              <a:buNone/>
+            </a:pPr>
+            <a:r>
+              <a:rPr lang="en-US" sz="2400" dirty="0" smtClean="0"/>
+              <a:t>@TheJerrel</a:t>
+            </a:r>
+          </a:p>
+          <a:p>
+            <a:pPr algn="ctr">
+              <a:buNone/>
+            </a:pPr>
+            <a:r>
+              <a:rPr lang="en-US" sz="2400" dirty="0" smtClean="0"/>
+              <a:t>www.jerrelblankenship.com</a:t>
+            </a:r>
+          </a:p>
+          <a:p>
+            <a:pPr algn="ctr">
+              <a:buNone/>
+            </a:pPr>
+            <a:endParaRPr lang="en-US" dirty="0" smtClean="0"/>
+          </a:p>
+          <a:p>
+            <a:pPr algn="ctr">
+              <a:buNone/>
+            </a:pPr>
+            <a:endParaRPr lang="en-US" dirty="0"/>
+          </a:p>
+        </p:txBody>
+      </p:sp>
+      <p:sp>
+        <p:nvSpPr>
+          <p:cNvPr id="4" name="Content Placeholder 3"/>
+          <p:cNvSpPr>
+            <a:spLocks noGrp="1"/>
+          </p:cNvSpPr>
+          <p:nvPr>
+            <p:ph sz="half" idx="2"/>
+          </p:nvPr>
+        </p:nvSpPr>
+        <p:spPr>
+          <a:xfrm>
+            <a:off x="10744200" y="3657601"/>
+            <a:ext cx="4038600" cy="2057401"/>
+          </a:xfrm>
+        </p:spPr>
+        <p:txBody>
+          <a:bodyPr>
+            <a:normAutofit/>
+          </a:bodyPr>
+          <a:lstStyle/>
+          <a:p>
+            <a:endParaRPr lang="en-US" dirty="0"/>
+          </a:p>
+        </p:txBody>
+      </p:sp>
+      <p:sp>
+        <p:nvSpPr>
+          <p:cNvPr id="5" name="TextBox 4"/>
+          <p:cNvSpPr txBox="1"/>
+          <p:nvPr/>
+        </p:nvSpPr>
+        <p:spPr>
+          <a:xfrm>
+            <a:off x="2319184" y="4686301"/>
+            <a:ext cx="4528085" cy="1200329"/>
+          </a:xfrm>
+          <a:prstGeom prst="rect">
+            <a:avLst/>
+          </a:prstGeom>
+          <a:noFill/>
+        </p:spPr>
+        <p:txBody>
+          <a:bodyPr wrap="square" rtlCol="0">
+            <a:spAutoFit/>
+          </a:bodyPr>
+          <a:lstStyle/>
+          <a:p>
+            <a:pPr algn="ctr">
+              <a:buNone/>
+            </a:pPr>
+            <a:r>
+              <a:rPr lang="en-US" sz="2400" dirty="0"/>
+              <a:t>Slide Deck Link:</a:t>
+            </a:r>
+          </a:p>
+          <a:p>
+            <a:pPr algn="ctr">
+              <a:buNone/>
+            </a:pPr>
+            <a:r>
+              <a:rPr lang="en-US" sz="2400" dirty="0"/>
+              <a:t>http://bit.ly/1aGLEJT</a:t>
+            </a:r>
+            <a:endParaRPr lang="en-US" sz="2400" dirty="0"/>
+          </a:p>
+          <a:p>
+            <a:endParaRPr lang="en-US" sz="2400" dirty="0"/>
+          </a:p>
+        </p:txBody>
+      </p:sp>
+    </p:spTree>
+    <p:extLst>
+      <p:ext uri="{BB962C8B-B14F-4D97-AF65-F5344CB8AC3E}">
+        <p14:creationId xmlns:p14="http://schemas.microsoft.com/office/powerpoint/2010/main" val="4141454704"/>
+      </p:ext>
+    </p:extLst>
+  </p:cSld>
+  <p:clrMapOvr>
+    <a:masterClrMapping/>
+  </p:clrMapOvr>
+  <p:timing>
+    <p:tnLst>
+      <p:par>
+        <p:cTn id="1" dur="indefinite" restart="never" nodeType="tmRoot"/>
+      </p:par>
+    </p:tnLst>
+  </p:timing>
+</p:sld>
+</file>
+
+<file path=ppt/slides/slide12.xml><?xml version="1.0" encoding="utf-8"?>
+<p:sld xmlns:a="http://schemas.openxmlformats.org/drawingml/2006/main" xmlns:r="http://schemas.openxmlformats.org/officeDocument/2006/relationships" xmlns:p="http://schemas.openxmlformats.org/presentationml/2006/main">
+  <p:cSld>
+    <p:spTree>
+      <p:nvGrpSpPr>
+        <p:cNvPr id="1" name=""/>
+        <p:cNvGrpSpPr/>
+        <p:nvPr/>
+      </p:nvGrpSpPr>
+      <p:grpSpPr>
+        <a:xfrm>
+          <a:off x="0" y="0"/>
+          <a:ext cx="0" cy="0"/>
+          <a:chOff x="0" y="0"/>
+          <a:chExt cx="0" cy="0"/>
+        </a:xfrm>
+      </p:grpSpPr>
+      <p:sp>
+        <p:nvSpPr>
+          <p:cNvPr id="2" name="Title 1"/>
+          <p:cNvSpPr>
+            <a:spLocks noGrp="1"/>
+          </p:cNvSpPr>
+          <p:nvPr>
+            <p:ph type="title"/>
+          </p:nvPr>
+        </p:nvSpPr>
         <p:spPr/>
         <p:txBody>
           <a:bodyPr/>
           <a:lstStyle/>
           <a:p>
             <a:r>
-              <a:rPr lang="en-US" dirty="0" err="1" smtClean="0"/>
+              <a:rPr lang="en-US" dirty="0" smtClean="0"/>
+              <a:t>Image Attributions</a:t>
+            </a:r>
+            <a:endParaRPr lang="en-US" dirty="0"/>
+          </a:p>
+        </p:txBody>
+      </p:sp>
+      <p:sp>
+        <p:nvSpPr>
+          <p:cNvPr id="3" name="Content Placeholder 2"/>
+          <p:cNvSpPr>
+            <a:spLocks noGrp="1"/>
+          </p:cNvSpPr>
+          <p:nvPr>
+            <p:ph idx="1"/>
+          </p:nvPr>
+        </p:nvSpPr>
+        <p:spPr/>
+        <p:txBody>
+          <a:bodyPr/>
+          <a:lstStyle/>
+          <a:p>
+            <a:r>
+              <a:rPr lang="en-US" dirty="0" smtClean="0"/>
+              <a:t>Smart </a:t>
+            </a:r>
+            <a:r>
+              <a:rPr lang="en-US" dirty="0" smtClean="0"/>
+              <a:t>Phone, Tablet, and PC – The Droid Guy</a:t>
+            </a:r>
+          </a:p>
+          <a:p>
+            <a:pPr>
+              <a:buNone/>
+            </a:pPr>
+            <a:endParaRPr lang="en-US" dirty="0"/>
+          </a:p>
+        </p:txBody>
+      </p:sp>
+    </p:spTree>
+  </p:cSld>
+  <p:clrMapOvr>
+    <a:masterClrMapping/>
+  </p:clrMapOvr>
+  <p:timing>
+    <p:tnLst>
+      <p:par>
+        <p:cTn id="1" dur="indefinite" restart="never" nodeType="tmRoot"/>
+      </p:par>
+    </p:tnLst>
+  </p:timing>
+</p:sld>
+</file>
+
+<file path=ppt/slides/slide13.xml><?xml version="1.0" encoding="utf-8"?>
+<p:sld xmlns:a="http://schemas.openxmlformats.org/drawingml/2006/main" xmlns:r="http://schemas.openxmlformats.org/officeDocument/2006/relationships" xmlns:p="http://schemas.openxmlformats.org/presentationml/2006/main">
+  <p:cSld>
+    <p:spTree>
+      <p:nvGrpSpPr>
+        <p:cNvPr id="1" name=""/>
+        <p:cNvGrpSpPr/>
+        <p:nvPr/>
+      </p:nvGrpSpPr>
+      <p:grpSpPr>
+        <a:xfrm>
+          <a:off x="0" y="0"/>
+          <a:ext cx="0" cy="0"/>
+          <a:chOff x="0" y="0"/>
+          <a:chExt cx="0" cy="0"/>
+        </a:xfrm>
+      </p:grpSpPr>
+      <p:sp>
+        <p:nvSpPr>
+          <p:cNvPr id="2" name="Title 1"/>
+          <p:cNvSpPr>
+            <a:spLocks noGrp="1"/>
+          </p:cNvSpPr>
+          <p:nvPr>
+            <p:ph type="title"/>
+          </p:nvPr>
+        </p:nvSpPr>
+        <p:spPr/>
+        <p:txBody>
+          <a:bodyPr/>
+          <a:lstStyle/>
+          <a:p>
+            <a:r>
+              <a:rPr lang="en-US" dirty="0" smtClean="0"/>
+              <a:t>Xamarin App Comparison</a:t>
+            </a:r>
+            <a:endParaRPr lang="en-US" dirty="0"/>
+          </a:p>
+        </p:txBody>
+      </p:sp>
+      <p:sp>
+        <p:nvSpPr>
+          <p:cNvPr id="4" name="Text Placeholder 3"/>
+          <p:cNvSpPr>
+            <a:spLocks noGrp="1"/>
+          </p:cNvSpPr>
+          <p:nvPr>
+            <p:ph type="body" idx="1"/>
+          </p:nvPr>
+        </p:nvSpPr>
+        <p:spPr/>
+        <p:txBody>
+          <a:bodyPr/>
+          <a:lstStyle/>
+          <a:p>
+            <a:pPr algn="ctr"/>
+            <a:r>
+              <a:rPr lang="en-US" dirty="0" smtClean="0"/>
+              <a:t>Windows Phone 8</a:t>
+            </a:r>
+            <a:endParaRPr lang="en-US" dirty="0"/>
+          </a:p>
+        </p:txBody>
+      </p:sp>
+      <p:pic>
+        <p:nvPicPr>
+          <p:cNvPr id="8" name="Content Placeholder 7"/>
+          <p:cNvPicPr>
+            <a:picLocks noGrp="1" noChangeAspect="1"/>
+          </p:cNvPicPr>
+          <p:nvPr>
+            <p:ph sz="half" idx="2"/>
+          </p:nvPr>
+        </p:nvPicPr>
+        <p:blipFill>
+          <a:blip r:embed="rId2" cstate="print">
+            <a:extLst>
+              <a:ext uri="{28A0092B-C50C-407E-A947-70E740481C1C}">
+                <a14:useLocalDpi xmlns:a14="http://schemas.microsoft.com/office/drawing/2010/main" val="0"/>
+              </a:ext>
+            </a:extLst>
+          </a:blip>
+          <a:stretch>
+            <a:fillRect/>
+          </a:stretch>
+        </p:blipFill>
+        <p:spPr>
+          <a:xfrm>
+            <a:off x="1487488" y="2870200"/>
+            <a:ext cx="1752599" cy="2921000"/>
+          </a:xfrm>
+        </p:spPr>
+      </p:pic>
+      <p:sp>
+        <p:nvSpPr>
+          <p:cNvPr id="6" name="Text Placeholder 5"/>
+          <p:cNvSpPr>
+            <a:spLocks noGrp="1"/>
+          </p:cNvSpPr>
+          <p:nvPr>
+            <p:ph type="body" sz="quarter" idx="3"/>
+          </p:nvPr>
+        </p:nvSpPr>
+        <p:spPr/>
+        <p:txBody>
+          <a:bodyPr/>
+          <a:lstStyle/>
+          <a:p>
+            <a:pPr algn="ctr"/>
+            <a:r>
+              <a:rPr lang="en-US" dirty="0" smtClean="0"/>
+              <a:t>Android</a:t>
+            </a:r>
+            <a:endParaRPr lang="en-US" dirty="0"/>
+          </a:p>
+        </p:txBody>
+      </p:sp>
+      <p:pic>
+        <p:nvPicPr>
+          <p:cNvPr id="9" name="Content Placeholder 8"/>
+          <p:cNvPicPr>
+            <a:picLocks noGrp="1" noChangeAspect="1"/>
+          </p:cNvPicPr>
+          <p:nvPr>
+            <p:ph sz="quarter" idx="4"/>
+          </p:nvPr>
+        </p:nvPicPr>
+        <p:blipFill>
+          <a:blip r:embed="rId3" cstate="print">
+            <a:extLst>
+              <a:ext uri="{28A0092B-C50C-407E-A947-70E740481C1C}">
+                <a14:useLocalDpi xmlns:a14="http://schemas.microsoft.com/office/drawing/2010/main" val="0"/>
+              </a:ext>
+            </a:extLst>
+          </a:blip>
+          <a:stretch>
+            <a:fillRect/>
+          </a:stretch>
+        </p:blipFill>
+        <p:spPr>
+          <a:xfrm>
+            <a:off x="5343757" y="3035187"/>
+            <a:ext cx="1958510" cy="2591025"/>
+          </a:xfrm>
+        </p:spPr>
+      </p:pic>
+    </p:spTree>
+    <p:extLst>
+      <p:ext uri="{BB962C8B-B14F-4D97-AF65-F5344CB8AC3E}">
+        <p14:creationId xmlns:p14="http://schemas.microsoft.com/office/powerpoint/2010/main" val="2878373410"/>
+      </p:ext>
+    </p:extLst>
+  </p:cSld>
+  <p:clrMapOvr>
+    <a:masterClrMapping/>
+  </p:clrMapOvr>
+  <p:timing>
+    <p:tnLst>
+      <p:par>
+        <p:cTn id="1" dur="indefinite" restart="never" nodeType="tmRoot"/>
+      </p:par>
+    </p:tnLst>
+  </p:timing>
+</p:sld>
+</file>
+
+<file path=ppt/slides/slide2.xml><?xml version="1.0" encoding="utf-8"?>
+<p:sld xmlns:a="http://schemas.openxmlformats.org/drawingml/2006/main" xmlns:r="http://schemas.openxmlformats.org/officeDocument/2006/relationships" xmlns:p="http://schemas.openxmlformats.org/presentationml/2006/main">
+  <p:cSld>
+    <p:spTree>
+      <p:nvGrpSpPr>
+        <p:cNvPr id="1" name=""/>
+        <p:cNvGrpSpPr/>
+        <p:nvPr/>
+      </p:nvGrpSpPr>
+      <p:grpSpPr>
+        <a:xfrm>
+          <a:off x="0" y="0"/>
+          <a:ext cx="0" cy="0"/>
+          <a:chOff x="0" y="0"/>
+          <a:chExt cx="0" cy="0"/>
+        </a:xfrm>
+      </p:grpSpPr>
+      <p:sp>
+        <p:nvSpPr>
+          <p:cNvPr id="4" name="Title 3"/>
+          <p:cNvSpPr>
+            <a:spLocks noGrp="1"/>
+          </p:cNvSpPr>
+          <p:nvPr>
+            <p:ph type="title"/>
+          </p:nvPr>
+        </p:nvSpPr>
+        <p:spPr>
+          <a:xfrm>
+            <a:off x="685800" y="524933"/>
+            <a:ext cx="7772400" cy="1456267"/>
+          </a:xfrm>
+        </p:spPr>
+        <p:txBody>
+          <a:bodyPr/>
+          <a:lstStyle/>
+          <a:p>
+            <a:pPr algn="ctr"/>
+            <a:r>
+              <a:rPr lang="en-US" dirty="0" smtClean="0"/>
+              <a:t>A Little About Myself</a:t>
+            </a:r>
+            <a:endParaRPr lang="en-US" dirty="0"/>
+          </a:p>
+        </p:txBody>
+      </p:sp>
+      <p:sp>
+        <p:nvSpPr>
+          <p:cNvPr id="5" name="Content Placeholder 4"/>
+          <p:cNvSpPr>
+            <a:spLocks noGrp="1"/>
+          </p:cNvSpPr>
+          <p:nvPr>
+            <p:ph sz="half" idx="1"/>
+          </p:nvPr>
+        </p:nvSpPr>
+        <p:spPr>
+          <a:xfrm>
+            <a:off x="1257300" y="2000865"/>
+            <a:ext cx="6629400" cy="3649134"/>
+          </a:xfrm>
+        </p:spPr>
+        <p:txBody>
+          <a:bodyPr>
+            <a:normAutofit/>
+          </a:bodyPr>
+          <a:lstStyle/>
+          <a:p>
+            <a:r>
+              <a:rPr lang="en-US" sz="2400" dirty="0" smtClean="0"/>
+              <a:t>Software </a:t>
+            </a:r>
+            <a:r>
+              <a:rPr lang="en-US" sz="2400" dirty="0"/>
+              <a:t>Engineer at RelayHealth</a:t>
+            </a:r>
+          </a:p>
+          <a:p>
+            <a:r>
+              <a:rPr lang="en-US" sz="2400" dirty="0"/>
+              <a:t>Author: </a:t>
+            </a:r>
+            <a:r>
+              <a:rPr lang="en-US" sz="2400" i="1" dirty="0"/>
+              <a:t>Pro Agile .NET Development with Scrum</a:t>
+            </a:r>
+          </a:p>
+          <a:p>
+            <a:r>
+              <a:rPr lang="en-US" sz="2400" dirty="0"/>
+              <a:t>Striving Software Craftsman</a:t>
+            </a:r>
+          </a:p>
+          <a:p>
+            <a:r>
+              <a:rPr lang="en-US" sz="2400" dirty="0"/>
+              <a:t>Certified Scrum Master</a:t>
+            </a:r>
+          </a:p>
+          <a:p>
+            <a:pPr algn="ctr">
+              <a:buNone/>
+            </a:pPr>
+            <a:endParaRPr lang="en-US" dirty="0"/>
+          </a:p>
+        </p:txBody>
+      </p:sp>
+      <p:sp>
+        <p:nvSpPr>
+          <p:cNvPr id="6" name="Content Placeholder 5"/>
+          <p:cNvSpPr>
+            <a:spLocks noGrp="1"/>
+          </p:cNvSpPr>
+          <p:nvPr>
+            <p:ph sz="half" idx="2"/>
+          </p:nvPr>
+        </p:nvSpPr>
+        <p:spPr>
+          <a:xfrm>
+            <a:off x="9525000" y="1447800"/>
+            <a:ext cx="3813048" cy="3649133"/>
+          </a:xfrm>
+        </p:spPr>
+        <p:txBody>
+          <a:bodyPr>
+            <a:normAutofit/>
+          </a:bodyPr>
+          <a:lstStyle/>
+          <a:p>
+            <a:pPr algn="ctr">
+              <a:buNone/>
+            </a:pPr>
+            <a:endParaRPr lang="en-US" b="1" dirty="0"/>
+          </a:p>
+        </p:txBody>
+      </p:sp>
+    </p:spTree>
+  </p:cSld>
+  <p:clrMapOvr>
+    <a:masterClrMapping/>
+  </p:clrMapOvr>
+  <p:timing>
+    <p:tnLst>
+      <p:par>
+        <p:cTn id="1" dur="indefinite" restart="never" nodeType="tmRoot"/>
+      </p:par>
+    </p:tnLst>
+  </p:timing>
+</p:sld>
+</file>
+
+<file path=ppt/slides/slide3.xml><?xml version="1.0" encoding="utf-8"?>
+<p:sld xmlns:a="http://schemas.openxmlformats.org/drawingml/2006/main" xmlns:r="http://schemas.openxmlformats.org/officeDocument/2006/relationships" xmlns:p="http://schemas.openxmlformats.org/presentationml/2006/main">
+  <p:cSld>
+    <p:spTree>
+      <p:nvGrpSpPr>
+        <p:cNvPr id="1" name=""/>
+        <p:cNvGrpSpPr/>
+        <p:nvPr/>
+      </p:nvGrpSpPr>
+      <p:grpSpPr>
+        <a:xfrm>
+          <a:off x="0" y="0"/>
+          <a:ext cx="0" cy="0"/>
+          <a:chOff x="0" y="0"/>
+          <a:chExt cx="0" cy="0"/>
+        </a:xfrm>
+      </p:grpSpPr>
+      <p:sp>
+        <p:nvSpPr>
+          <p:cNvPr id="2" name="Title 1"/>
+          <p:cNvSpPr>
+            <a:spLocks noGrp="1"/>
+          </p:cNvSpPr>
+          <p:nvPr>
+            <p:ph type="title"/>
+          </p:nvPr>
+        </p:nvSpPr>
+        <p:spPr>
+          <a:xfrm>
+            <a:off x="457200" y="609600"/>
+            <a:ext cx="7772400" cy="1456267"/>
+          </a:xfrm>
+        </p:spPr>
+        <p:txBody>
+          <a:bodyPr>
+            <a:normAutofit/>
+          </a:bodyPr>
+          <a:lstStyle/>
+          <a:p>
+            <a:pPr algn="ctr"/>
+            <a:r>
+              <a:rPr lang="en-US" sz="4000" dirty="0" smtClean="0"/>
+              <a:t>Which One Do I Choose?</a:t>
+            </a:r>
+            <a:endParaRPr lang="en-US" sz="4000" dirty="0"/>
+          </a:p>
+        </p:txBody>
+      </p:sp>
+      <p:pic>
+        <p:nvPicPr>
+          <p:cNvPr id="4" name="Content Placeholder 3" descr="smartphone-tablet-pc.png"/>
+          <p:cNvPicPr>
+            <a:picLocks noGrp="1" noChangeAspect="1"/>
+          </p:cNvPicPr>
+          <p:nvPr>
+            <p:ph idx="1"/>
+          </p:nvPr>
+        </p:nvPicPr>
+        <p:blipFill>
+          <a:blip r:embed="rId3" cstate="print"/>
+          <a:stretch>
+            <a:fillRect/>
+          </a:stretch>
+        </p:blipFill>
+        <p:spPr>
+          <a:xfrm>
+            <a:off x="1962150" y="2361406"/>
+            <a:ext cx="4762500" cy="3209925"/>
+          </a:xfrm>
+        </p:spPr>
+      </p:pic>
+    </p:spTree>
+  </p:cSld>
+  <p:clrMapOvr>
+    <a:masterClrMapping/>
+  </p:clrMapOvr>
+  <p:timing>
+    <p:tnLst>
+      <p:par>
+        <p:cTn id="1" dur="indefinite" restart="never" nodeType="tmRoot"/>
+      </p:par>
+    </p:tnLst>
+  </p:timing>
+</p:sld>
+</file>
+
+<file path=ppt/slides/slide4.xml><?xml version="1.0" encoding="utf-8"?>
+<p:sld xmlns:a="http://schemas.openxmlformats.org/drawingml/2006/main" xmlns:r="http://schemas.openxmlformats.org/officeDocument/2006/relationships" xmlns:p="http://schemas.openxmlformats.org/presentationml/2006/main">
+  <p:cSld>
+    <p:spTree>
+      <p:nvGrpSpPr>
+        <p:cNvPr id="1" name=""/>
+        <p:cNvGrpSpPr/>
+        <p:nvPr/>
+      </p:nvGrpSpPr>
+      <p:grpSpPr>
+        <a:xfrm>
+          <a:off x="0" y="0"/>
+          <a:ext cx="0" cy="0"/>
+          <a:chOff x="0" y="0"/>
+          <a:chExt cx="0" cy="0"/>
+        </a:xfrm>
+      </p:grpSpPr>
+      <p:sp>
+        <p:nvSpPr>
+          <p:cNvPr id="2" name="Title 1"/>
+          <p:cNvSpPr>
+            <a:spLocks noGrp="1"/>
+          </p:cNvSpPr>
+          <p:nvPr>
+            <p:ph type="title"/>
+          </p:nvPr>
+        </p:nvSpPr>
+        <p:spPr/>
+        <p:txBody>
+          <a:bodyPr>
+            <a:normAutofit/>
+          </a:bodyPr>
+          <a:lstStyle/>
+          <a:p>
+            <a:pPr algn="ctr"/>
+            <a:r>
+              <a:rPr lang="en-US" sz="4000" dirty="0" smtClean="0"/>
+              <a:t>Frameworks To The Rescue</a:t>
+            </a:r>
+            <a:endParaRPr lang="en-US" sz="4000" dirty="0"/>
+          </a:p>
+        </p:txBody>
+      </p:sp>
+      <p:sp>
+        <p:nvSpPr>
+          <p:cNvPr id="3" name="Content Placeholder 2"/>
+          <p:cNvSpPr>
+            <a:spLocks noGrp="1"/>
+          </p:cNvSpPr>
+          <p:nvPr>
+            <p:ph idx="1"/>
+          </p:nvPr>
+        </p:nvSpPr>
+        <p:spPr/>
+        <p:txBody>
+          <a:bodyPr/>
+          <a:lstStyle/>
+          <a:p>
+            <a:pPr algn="ctr">
+              <a:buNone/>
+            </a:pPr>
+            <a:r>
+              <a:rPr lang="en-US" sz="2800" dirty="0" err="1" smtClean="0"/>
+              <a:t>PhoneGap</a:t>
+            </a:r>
+            <a:endParaRPr lang="en-US" sz="2800" dirty="0" smtClean="0"/>
+          </a:p>
+          <a:p>
+            <a:pPr algn="ctr">
+              <a:buNone/>
+            </a:pPr>
+            <a:r>
+              <a:rPr lang="en-US" sz="2800" dirty="0" err="1" smtClean="0"/>
               <a:t>Xamarin</a:t>
             </a:r>
+            <a:endParaRPr lang="en-US" sz="2800" dirty="0" smtClean="0"/>
+          </a:p>
+          <a:p>
+            <a:pPr algn="ctr">
+              <a:buNone/>
+            </a:pPr>
+            <a:r>
+              <a:rPr lang="en-US" sz="2800" dirty="0" err="1" smtClean="0"/>
+              <a:t>AppMobi</a:t>
+            </a:r>
+            <a:endParaRPr lang="en-US" sz="2800" dirty="0" smtClean="0"/>
+          </a:p>
+          <a:p>
+            <a:pPr algn="ctr">
+              <a:buNone/>
+            </a:pPr>
+            <a:r>
+              <a:rPr lang="en-US" sz="2800" dirty="0" smtClean="0"/>
+              <a:t>Unity</a:t>
+            </a:r>
+          </a:p>
+          <a:p>
+            <a:pPr algn="ctr">
+              <a:buNone/>
+            </a:pPr>
+            <a:r>
+              <a:rPr lang="en-US" sz="2800" dirty="0" err="1" smtClean="0"/>
+              <a:t>Appcelerator</a:t>
+            </a:r>
+            <a:endParaRPr lang="en-US" sz="2800" dirty="0" smtClean="0"/>
+          </a:p>
+          <a:p>
+            <a:pPr algn="ctr">
+              <a:buNone/>
+            </a:pPr>
+            <a:r>
+              <a:rPr lang="en-US" sz="2800" dirty="0" smtClean="0"/>
+              <a:t>Adobe Flex</a:t>
+            </a:r>
+          </a:p>
+          <a:p>
+            <a:pPr algn="ctr">
+              <a:buNone/>
+            </a:pPr>
+            <a:endParaRPr lang="en-US" dirty="0"/>
+          </a:p>
+        </p:txBody>
+      </p:sp>
+    </p:spTree>
+    <p:extLst>
+      <p:ext uri="{BB962C8B-B14F-4D97-AF65-F5344CB8AC3E}">
+        <p14:creationId xmlns:p14="http://schemas.microsoft.com/office/powerpoint/2010/main" val="1918943846"/>
+      </p:ext>
+    </p:extLst>
+  </p:cSld>
+  <p:clrMapOvr>
+    <a:masterClrMapping/>
+  </p:clrMapOvr>
+  <p:timing>
+    <p:tnLst>
+      <p:par>
+        <p:cTn id="1" dur="indefinite" restart="never" nodeType="tmRoot"/>
+      </p:par>
+    </p:tnLst>
+  </p:timing>
+</p:sld>
+</file>
+
+<file path=ppt/slides/slide5.xml><?xml version="1.0" encoding="utf-8"?>
+<p:sld xmlns:a="http://schemas.openxmlformats.org/drawingml/2006/main" xmlns:r="http://schemas.openxmlformats.org/officeDocument/2006/relationships" xmlns:p="http://schemas.openxmlformats.org/presentationml/2006/main">
+  <p:cSld>
+    <p:spTree>
+      <p:nvGrpSpPr>
+        <p:cNvPr id="1" name=""/>
+        <p:cNvGrpSpPr/>
+        <p:nvPr/>
+      </p:nvGrpSpPr>
+      <p:grpSpPr>
+        <a:xfrm>
+          <a:off x="0" y="0"/>
+          <a:ext cx="0" cy="0"/>
+          <a:chOff x="0" y="0"/>
+          <a:chExt cx="0" cy="0"/>
+        </a:xfrm>
+      </p:grpSpPr>
+      <p:sp>
+        <p:nvSpPr>
+          <p:cNvPr id="4" name="Title 3"/>
+          <p:cNvSpPr>
+            <a:spLocks noGrp="1"/>
+          </p:cNvSpPr>
+          <p:nvPr>
+            <p:ph type="ctrTitle"/>
+          </p:nvPr>
+        </p:nvSpPr>
+        <p:spPr/>
+        <p:txBody>
+          <a:bodyPr>
+            <a:normAutofit/>
+          </a:bodyPr>
+          <a:lstStyle/>
+          <a:p>
+            <a:r>
+              <a:rPr lang="en-US" sz="6600" dirty="0" err="1" smtClean="0"/>
+              <a:t>Xamarin</a:t>
+            </a:r>
+            <a:endParaRPr lang="en-US" sz="6600" dirty="0"/>
+          </a:p>
+        </p:txBody>
+      </p:sp>
+    </p:spTree>
+  </p:cSld>
+  <p:clrMapOvr>
+    <a:masterClrMapping/>
+  </p:clrMapOvr>
+  <p:timing>
+    <p:tnLst>
+      <p:par>
+        <p:cTn id="1" dur="indefinite" restart="never" nodeType="tmRoot"/>
+      </p:par>
+    </p:tnLst>
+  </p:timing>
+</p:sld>
+</file>
+
+<file path=ppt/slides/slide6.xml><?xml version="1.0" encoding="utf-8"?>
+<p:sld xmlns:a="http://schemas.openxmlformats.org/drawingml/2006/main" xmlns:r="http://schemas.openxmlformats.org/officeDocument/2006/relationships" xmlns:p="http://schemas.openxmlformats.org/presentationml/2006/main">
+  <p:cSld>
+    <p:spTree>
+      <p:nvGrpSpPr>
+        <p:cNvPr id="1" name=""/>
+        <p:cNvGrpSpPr/>
+        <p:nvPr/>
+      </p:nvGrpSpPr>
+      <p:grpSpPr>
+        <a:xfrm>
+          <a:off x="0" y="0"/>
+          <a:ext cx="0" cy="0"/>
+          <a:chOff x="0" y="0"/>
+          <a:chExt cx="0" cy="0"/>
+        </a:xfrm>
+      </p:grpSpPr>
+      <p:sp>
+        <p:nvSpPr>
+          <p:cNvPr id="2" name="Title 1"/>
+          <p:cNvSpPr>
+            <a:spLocks noGrp="1"/>
+          </p:cNvSpPr>
+          <p:nvPr>
+            <p:ph type="title"/>
+          </p:nvPr>
+        </p:nvSpPr>
+        <p:spPr>
+          <a:xfrm>
+            <a:off x="457200" y="609601"/>
+            <a:ext cx="7772400" cy="777571"/>
+          </a:xfrm>
+        </p:spPr>
+        <p:txBody>
+          <a:bodyPr>
+            <a:normAutofit/>
+          </a:bodyPr>
+          <a:lstStyle/>
+          <a:p>
+            <a:pPr algn="ctr"/>
+            <a:r>
+              <a:rPr lang="en-US" sz="4000" dirty="0" smtClean="0"/>
+              <a:t>Details</a:t>
+            </a:r>
+            <a:endParaRPr lang="en-US" sz="4000" dirty="0"/>
+          </a:p>
+        </p:txBody>
+      </p:sp>
+      <p:sp>
+        <p:nvSpPr>
+          <p:cNvPr id="3" name="Content Placeholder 2"/>
+          <p:cNvSpPr>
+            <a:spLocks noGrp="1"/>
+          </p:cNvSpPr>
+          <p:nvPr>
+            <p:ph idx="1"/>
+          </p:nvPr>
+        </p:nvSpPr>
+        <p:spPr>
+          <a:xfrm>
+            <a:off x="533400" y="1401650"/>
+            <a:ext cx="7620000" cy="1896532"/>
+          </a:xfrm>
+        </p:spPr>
+        <p:txBody>
+          <a:bodyPr>
+            <a:normAutofit lnSpcReduction="10000"/>
+          </a:bodyPr>
+          <a:lstStyle/>
+          <a:p>
             <a:r>
               <a:rPr lang="en-US" dirty="0" smtClean="0"/>
-              <a:t> Details</a:t>
-            </a:r>
-            <a:endParaRPr lang="en-US" dirty="0"/>
-          </a:p>
-        </p:txBody>
-      </p:sp>
-      <p:sp>
-        <p:nvSpPr>
-          <p:cNvPr id="3" name="Content Placeholder 2"/>
-          <p:cNvSpPr>
-            <a:spLocks noGrp="1"/>
-          </p:cNvSpPr>
-          <p:nvPr>
-            <p:ph idx="1"/>
-          </p:nvPr>
-        </p:nvSpPr>
-        <p:spPr/>
-        <p:txBody>
-          <a:bodyPr/>
-          <a:lstStyle/>
-          <a:p>
+              <a:t>Cross-platform development with C</a:t>
+            </a:r>
             <a:r>
               <a:rPr lang="en-US" dirty="0" smtClean="0"/>
-              <a:t>Cross-platform development with C#</a:t>
-            </a:r>
+              <a:t>#</a:t>
+            </a:r>
+          </a:p>
+          <a:p>
+            <a:pPr lvl="1"/>
+            <a:r>
+              <a:rPr lang="en-US" dirty="0" smtClean="0"/>
+              <a:t>One shared C# codebase</a:t>
+            </a:r>
+          </a:p>
+          <a:p>
+            <a:pPr lvl="1"/>
+            <a:r>
+              <a:rPr lang="en-US" dirty="0" smtClean="0"/>
+              <a:t>Separate platform-specific user interfaces (C#)</a:t>
+            </a:r>
+            <a:endParaRPr lang="en-US" dirty="0" smtClean="0"/>
           </a:p>
           <a:p>
             <a:r>
@@ -7671,7 +8797,165 @@
 </p:sld>
 </file>
 
-<file path=ppt/slides/slide11.xml><?xml version="1.0" encoding="utf-8"?>
+<file path=ppt/slides/slide7.xml><?xml version="1.0" encoding="utf-8"?>
+<p:sld xmlns:a="http://schemas.openxmlformats.org/drawingml/2006/main" xmlns:r="http://schemas.openxmlformats.org/officeDocument/2006/relationships" xmlns:p="http://schemas.openxmlformats.org/presentationml/2006/main">
+  <p:cSld>
+    <p:spTree>
+      <p:nvGrpSpPr>
+        <p:cNvPr id="1" name=""/>
+        <p:cNvGrpSpPr/>
+        <p:nvPr/>
+      </p:nvGrpSpPr>
+      <p:grpSpPr>
+        <a:xfrm>
+          <a:off x="0" y="0"/>
+          <a:ext cx="0" cy="0"/>
+          <a:chOff x="0" y="0"/>
+          <a:chExt cx="0" cy="0"/>
+        </a:xfrm>
+      </p:grpSpPr>
+      <p:sp>
+        <p:nvSpPr>
+          <p:cNvPr id="2" name="Title 1"/>
+          <p:cNvSpPr>
+            <a:spLocks noGrp="1"/>
+          </p:cNvSpPr>
+          <p:nvPr>
+            <p:ph type="title"/>
+          </p:nvPr>
+        </p:nvSpPr>
+        <p:spPr/>
+        <p:txBody>
+          <a:bodyPr>
+            <a:normAutofit/>
+          </a:bodyPr>
+          <a:lstStyle/>
+          <a:p>
+            <a:pPr algn="ctr"/>
+            <a:r>
+              <a:rPr lang="en-US" sz="4000" dirty="0" smtClean="0"/>
+              <a:t>Components &amp; Add-Ons</a:t>
+            </a:r>
+            <a:endParaRPr lang="en-US" sz="4000" dirty="0"/>
+          </a:p>
+        </p:txBody>
+      </p:sp>
+      <p:sp>
+        <p:nvSpPr>
+          <p:cNvPr id="3" name="Content Placeholder 2"/>
+          <p:cNvSpPr>
+            <a:spLocks noGrp="1"/>
+          </p:cNvSpPr>
+          <p:nvPr>
+            <p:ph idx="1"/>
+          </p:nvPr>
+        </p:nvSpPr>
+        <p:spPr/>
+        <p:txBody>
+          <a:bodyPr>
+            <a:normAutofit/>
+          </a:bodyPr>
+          <a:lstStyle/>
+          <a:p>
+            <a:r>
+              <a:rPr lang="en-US" dirty="0" smtClean="0"/>
+              <a:t>Pre-Built Components</a:t>
+            </a:r>
+          </a:p>
+          <a:p>
+            <a:pPr lvl="1"/>
+            <a:r>
+              <a:rPr lang="en-US" dirty="0" smtClean="0"/>
+              <a:t>Allows you to quickly add functionality to your app</a:t>
+            </a:r>
+          </a:p>
+          <a:p>
+            <a:pPr lvl="1"/>
+            <a:r>
+              <a:rPr lang="en-US" dirty="0" smtClean="0"/>
+              <a:t>Examples:</a:t>
+            </a:r>
+          </a:p>
+          <a:p>
+            <a:pPr lvl="2"/>
+            <a:r>
+              <a:rPr lang="en-US" dirty="0" smtClean="0"/>
+              <a:t>Azure Mobile Services</a:t>
+            </a:r>
+          </a:p>
+          <a:p>
+            <a:pPr lvl="2"/>
+            <a:r>
+              <a:rPr lang="en-US" dirty="0" err="1" smtClean="0"/>
+              <a:t>DropBox</a:t>
+            </a:r>
+            <a:r>
+              <a:rPr lang="en-US" dirty="0" smtClean="0"/>
+              <a:t> Sync</a:t>
+            </a:r>
+          </a:p>
+          <a:p>
+            <a:pPr lvl="2"/>
+            <a:r>
+              <a:rPr lang="en-US" dirty="0" smtClean="0"/>
+              <a:t>Facebook SDK</a:t>
+            </a:r>
+          </a:p>
+          <a:p>
+            <a:pPr lvl="2"/>
+            <a:r>
+              <a:rPr lang="en-US" dirty="0" smtClean="0"/>
+              <a:t>SQLite.NET</a:t>
+            </a:r>
+          </a:p>
+          <a:p>
+            <a:pPr lvl="2"/>
+            <a:r>
+              <a:rPr lang="en-US" dirty="0" err="1" smtClean="0"/>
+              <a:t>RestSharp</a:t>
+            </a:r>
+            <a:r>
+              <a:rPr lang="en-US" dirty="0" smtClean="0"/>
+              <a:t> </a:t>
+            </a:r>
+          </a:p>
+          <a:p>
+            <a:pPr lvl="2"/>
+            <a:r>
+              <a:rPr lang="en-US" dirty="0" err="1" smtClean="0"/>
+              <a:t>ConverFlowView</a:t>
+            </a:r>
+            <a:endParaRPr lang="en-US" dirty="0" smtClean="0"/>
+          </a:p>
+          <a:p>
+            <a:r>
+              <a:rPr lang="en-US" dirty="0" smtClean="0"/>
+              <a:t>Visual Studio Integration</a:t>
+            </a:r>
+          </a:p>
+        </p:txBody>
+      </p:sp>
+    </p:spTree>
+    <p:extLst>
+      <p:ext uri="{BB962C8B-B14F-4D97-AF65-F5344CB8AC3E}">
+        <p14:creationId xmlns:p14="http://schemas.microsoft.com/office/powerpoint/2010/main" val="116564576"/>
+      </p:ext>
+    </p:extLst>
+  </p:cSld>
+  <p:clrMapOvr>
+    <a:masterClrMapping/>
+  </p:clrMapOvr>
+  <p:timing>
+    <p:tnLst>
+      <p:par>
+        <p:cTn id="1" dur="indefinite" restart="never" nodeType="tmRoot"/>
+      </p:par>
+    </p:tnLst>
+  </p:timing>
+</p:sld>
+</file>
+
+<file path=ppt/slides/slide8.xml><?xml version="1.0" encoding="utf-8"?>
 <p:sld xmlns:a="http://schemas.openxmlformats.org/drawingml/2006/main" xmlns:r="http://schemas.openxmlformats.org/officeDocument/2006/relationships" xmlns:p="http://schemas.openxmlformats.org/presentationml/2006/main">
   <p:cSld>
     <p:spTree>
@@ -7733,7 +9017,7 @@
 </p:sld>
 </file>
 
-<file path=ppt/slides/slide12.xml><?xml version="1.0" encoding="utf-8"?>
+<file path=ppt/slides/slide9.xml><?xml version="1.0" encoding="utf-8"?>
 <p:sld xmlns:a="http://schemas.openxmlformats.org/drawingml/2006/main" xmlns:r="http://schemas.openxmlformats.org/officeDocument/2006/relationships" xmlns:p="http://schemas.openxmlformats.org/presentationml/2006/main">
   <p:cSld>
     <p:spTree>
@@ -7752,123 +9036,52 @@
       </p:grpSpPr>
       <p:sp>
         <p:nvSpPr>
-          <p:cNvPr id="4" name="Title 3"/>
-          <p:cNvSpPr>
-            <a:spLocks noGrp="1"/>
-          </p:cNvSpPr>
-          <p:nvPr>
-            <p:ph type="ctrTitle"/>
+          <p:cNvPr id="2" name="Title 1"/>
+          <p:cNvSpPr>
+            <a:spLocks noGrp="1"/>
+          </p:cNvSpPr>
+          <p:nvPr>
+            <p:ph type="title"/>
           </p:nvPr>
         </p:nvSpPr>
         <p:spPr/>
         <p:txBody>
           <a:bodyPr>
-            <a:noAutofit/>
+            <a:normAutofit/>
           </a:bodyPr>
           <a:lstStyle/>
           <a:p>
-            <a:r>
-              <a:rPr lang="en-US" sz="6600" dirty="0" err="1" smtClean="0"/>
-              <a:t>PhoneGap</a:t>
-            </a:r>
-            <a:r>
-              <a:rPr lang="en-US" sz="6600" dirty="0" smtClean="0"/>
-              <a:t> v. </a:t>
-            </a:r>
-            <a:r>
-              <a:rPr lang="en-US" sz="6600" dirty="0" err="1" smtClean="0"/>
-              <a:t>Xamarin</a:t>
-            </a:r>
-            <a:r>
-              <a:rPr lang="en-US" sz="6600" dirty="0" smtClean="0"/>
-              <a:t>:</a:t>
-            </a:r>
-            <a:br>
-              <a:rPr lang="en-US" sz="6600" dirty="0" smtClean="0"/>
-            </a:br>
-            <a:r>
-              <a:rPr lang="en-US" sz="6000" dirty="0" smtClean="0"/>
-              <a:t>Which do I choose?</a:t>
-            </a:r>
-            <a:endParaRPr lang="en-US" sz="6000" dirty="0"/>
-          </a:p>
-        </p:txBody>
-      </p:sp>
-    </p:spTree>
-  </p:cSld>
-  <p:clrMapOvr>
-    <a:masterClrMapping/>
-  </p:clrMapOvr>
-  <p:timing>
-    <p:tnLst>
-      <p:par>
-        <p:cTn id="1" dur="indefinite" restart="never" nodeType="tmRoot"/>
-      </p:par>
-    </p:tnLst>
-  </p:timing>
-</p:sld>
-</file>
-
-<file path=ppt/slides/slide13.xml><?xml version="1.0" encoding="utf-8"?>
-<p:sld xmlns:a="http://schemas.openxmlformats.org/drawingml/2006/main" xmlns:r="http://schemas.openxmlformats.org/officeDocument/2006/relationships" xmlns:p="http://schemas.openxmlformats.org/presentationml/2006/main">
-  <p:cSld>
-    <p:spTree>
-      <p:nvGrpSpPr>
-        <p:cNvPr id="1" name=""/>
-        <p:cNvGrpSpPr/>
-        <p:nvPr/>
-      </p:nvGrpSpPr>
-      <p:grpSpPr>
-        <a:xfrm>
-          <a:off x="0" y="0"/>
-          <a:ext cx="0" cy="0"/>
-          <a:chOff x="0" y="0"/>
-          <a:chExt cx="0" cy="0"/>
-        </a:xfrm>
-      </p:grpSpPr>
-      <p:sp>
-        <p:nvSpPr>
-          <p:cNvPr id="2" name="Title 1"/>
-          <p:cNvSpPr>
-            <a:spLocks noGrp="1"/>
-          </p:cNvSpPr>
-          <p:nvPr>
-            <p:ph type="title"/>
+            <a:pPr algn="ctr"/>
+            <a:r>
+              <a:rPr lang="en-US" sz="4000" dirty="0" smtClean="0"/>
+              <a:t>Key Considerations</a:t>
+            </a:r>
+            <a:endParaRPr lang="en-US" sz="4000" dirty="0"/>
+          </a:p>
+        </p:txBody>
+      </p:sp>
+      <p:sp>
+        <p:nvSpPr>
+          <p:cNvPr id="3" name="Content Placeholder 2"/>
+          <p:cNvSpPr>
+            <a:spLocks noGrp="1"/>
+          </p:cNvSpPr>
+          <p:nvPr>
+            <p:ph idx="1"/>
           </p:nvPr>
         </p:nvSpPr>
         <p:spPr/>
         <p:txBody>
-          <a:bodyPr/>
-          <a:lstStyle/>
-          <a:p>
-            <a:r>
-              <a:rPr lang="en-US" dirty="0" smtClean="0"/>
-              <a:t>Key Considerations</a:t>
-            </a:r>
-            <a:endParaRPr lang="en-US" dirty="0"/>
-          </a:p>
-        </p:txBody>
-      </p:sp>
-      <p:sp>
-        <p:nvSpPr>
-          <p:cNvPr id="3" name="Content Placeholder 2"/>
-          <p:cNvSpPr>
-            <a:spLocks noGrp="1"/>
-          </p:cNvSpPr>
-          <p:nvPr>
-            <p:ph idx="1"/>
-          </p:nvPr>
-        </p:nvSpPr>
-        <p:spPr/>
-        <p:txBody>
-          <a:bodyPr/>
+          <a:bodyPr>
+            <a:normAutofit/>
+          </a:bodyPr>
           <a:lstStyle/>
           <a:p>
             <a:pPr marL="0" indent="0" algn="ctr">
               <a:buNone/>
             </a:pPr>
             <a:r>
-              <a:rPr lang="en-US" dirty="0" smtClean="0"/>
+              <a:rPr lang="en-US" sz="2400" dirty="0" smtClean="0"/>
               <a:t>Cost</a:t>
             </a:r>
           </a:p>
@@ -7877,7 +9090,7 @@
               <a:buNone/>
             </a:pPr>
             <a:r>
-              <a:rPr lang="en-US" dirty="0" smtClean="0"/>
+              <a:rPr lang="en-US" sz="2400" dirty="0" smtClean="0"/>
               <a:t>Performance</a:t>
             </a:r>
           </a:p>
@@ -7886,7 +9099,7 @@
               <a:buNone/>
             </a:pPr>
             <a:r>
-              <a:rPr lang="en-US" dirty="0" smtClean="0"/>
+              <a:rPr lang="en-US" sz="2400" dirty="0" smtClean="0"/>
               <a:t>Supported platforms</a:t>
             </a:r>
           </a:p>
@@ -7895,10 +9108,10 @@
               <a:buNone/>
             </a:pPr>
             <a:r>
-              <a:rPr lang="en-US" dirty="0" smtClean="0"/>
+              <a:rPr lang="en-US" sz="2400" dirty="0" smtClean="0"/>
               <a:t>Native app experience</a:t>
             </a:r>
-            <a:endParaRPr lang="en-US" dirty="0"/>
+            <a:endParaRPr lang="en-US" sz="2400" dirty="0"/>
           </a:p>
         </p:txBody>
       </p:sp>
@@ -8399,1392 +9612,6 @@
             </p:seq>
           </p:childTnLst>
         </p:cTn>
-      </p:par>
-    </p:tnLst>
-  </p:timing>
-</p:sld>
-</file>
-
-<file path=ppt/slides/slide14.xml><?xml version="1.0" encoding="utf-8"?>
-<p:sld xmlns:a="http://schemas.openxmlformats.org/drawingml/2006/main" xmlns:r="http://schemas.openxmlformats.org/officeDocument/2006/relationships" xmlns:p="http://schemas.openxmlformats.org/presentationml/2006/main">
-  <p:cSld>
-    <p:spTree>
-      <p:nvGrpSpPr>
-        <p:cNvPr id="1" name=""/>
-        <p:cNvGrpSpPr/>
-        <p:nvPr/>
-      </p:nvGrpSpPr>
-      <p:grpSpPr>
-        <a:xfrm>
-          <a:off x="0" y="0"/>
-          <a:ext cx="0" cy="0"/>
-          <a:chOff x="0" y="0"/>
-          <a:chExt cx="0" cy="0"/>
-        </a:xfrm>
-      </p:grpSpPr>
-      <p:sp>
-        <p:nvSpPr>
-          <p:cNvPr id="5" name="Title 4"/>
-          <p:cNvSpPr>
-            <a:spLocks noGrp="1"/>
-          </p:cNvSpPr>
-          <p:nvPr>
-            <p:ph type="ctrTitle"/>
-          </p:nvPr>
-        </p:nvSpPr>
-        <p:spPr/>
-        <p:txBody>
-          <a:bodyPr>
-            <a:normAutofit/>
-          </a:bodyPr>
-          <a:lstStyle/>
-          <a:p>
-            <a:r>
-              <a:rPr lang="en-US" sz="6600" dirty="0" smtClean="0"/>
-              <a:t>Questions?</a:t>
-            </a:r>
-            <a:endParaRPr lang="en-US" sz="6600" dirty="0"/>
-          </a:p>
-        </p:txBody>
-      </p:sp>
-    </p:spTree>
-  </p:cSld>
-  <p:clrMapOvr>
-    <a:masterClrMapping/>
-  </p:clrMapOvr>
-  <p:timing>
-    <p:tnLst>
-      <p:par>
-        <p:cTn id="1" dur="indefinite" restart="never" nodeType="tmRoot"/>
-      </p:par>
-    </p:tnLst>
-  </p:timing>
-</p:sld>
-</file>
-
-<file path=ppt/slides/slide15.xml><?xml version="1.0" encoding="utf-8"?>
-<p:sld xmlns:a="http://schemas.openxmlformats.org/drawingml/2006/main" xmlns:r="http://schemas.openxmlformats.org/officeDocument/2006/relationships" xmlns:p="http://schemas.openxmlformats.org/presentationml/2006/main">
-  <p:cSld>
-    <p:spTree>
-      <p:nvGrpSpPr>
-        <p:cNvPr id="1" name=""/>
-        <p:cNvGrpSpPr/>
-        <p:nvPr/>
-      </p:nvGrpSpPr>
-      <p:grpSpPr>
-        <a:xfrm>
-          <a:off x="0" y="0"/>
-          <a:ext cx="0" cy="0"/>
-          <a:chOff x="0" y="0"/>
-          <a:chExt cx="0" cy="0"/>
-        </a:xfrm>
-      </p:grpSpPr>
-      <p:sp>
-        <p:nvSpPr>
-          <p:cNvPr id="2" name="Title 1"/>
-          <p:cNvSpPr>
-            <a:spLocks noGrp="1"/>
-          </p:cNvSpPr>
-          <p:nvPr>
-            <p:ph type="title"/>
-          </p:nvPr>
-        </p:nvSpPr>
-        <p:spPr/>
-        <p:txBody>
-          <a:bodyPr/>
-          <a:lstStyle/>
-          <a:p>
-            <a:endParaRPr lang="en-US"/>
-          </a:p>
-        </p:txBody>
-      </p:sp>
-      <p:pic>
-        <p:nvPicPr>
-          <p:cNvPr id="7" name="Content Placeholder 6"/>
-          <p:cNvPicPr>
-            <a:picLocks noGrp="1" noChangeAspect="1"/>
-          </p:cNvPicPr>
-          <p:nvPr>
-            <p:ph idx="1"/>
-          </p:nvPr>
-        </p:nvPicPr>
-        <p:blipFill>
-          <a:blip r:embed="rId2" cstate="print">
-            <a:extLst>
-              <a:ext uri="{28A0092B-C50C-407E-A947-70E740481C1C}">
-                <a14:useLocalDpi xmlns:a14="http://schemas.microsoft.com/office/drawing/2010/main" val="0"/>
-              </a:ext>
-            </a:extLst>
-          </a:blip>
-          <a:stretch>
-            <a:fillRect/>
-          </a:stretch>
-        </p:blipFill>
-        <p:spPr>
-          <a:xfrm>
-            <a:off x="2516892" y="2141538"/>
-            <a:ext cx="3653016" cy="3649662"/>
-          </a:xfrm>
-        </p:spPr>
-      </p:pic>
-    </p:spTree>
-    <p:extLst>
-      <p:ext uri="{BB962C8B-B14F-4D97-AF65-F5344CB8AC3E}">
-        <p14:creationId xmlns:p14="http://schemas.microsoft.com/office/powerpoint/2010/main" val="1309489257"/>
-      </p:ext>
-    </p:extLst>
-  </p:cSld>
-  <p:clrMapOvr>
-    <a:masterClrMapping/>
-  </p:clrMapOvr>
-  <p:timing>
-    <p:tnLst>
-      <p:par>
-        <p:cTn id="1" dur="indefinite" restart="never" nodeType="tmRoot"/>
-      </p:par>
-    </p:tnLst>
-  </p:timing>
-</p:sld>
-</file>
-
-<file path=ppt/slides/slide16.xml><?xml version="1.0" encoding="utf-8"?>
-<p:sld xmlns:a="http://schemas.openxmlformats.org/drawingml/2006/main" xmlns:r="http://schemas.openxmlformats.org/officeDocument/2006/relationships" xmlns:p="http://schemas.openxmlformats.org/presentationml/2006/main">
-  <p:cSld>
-    <p:spTree>
-      <p:nvGrpSpPr>
-        <p:cNvPr id="1" name=""/>
-        <p:cNvGrpSpPr/>
-        <p:nvPr/>
-      </p:nvGrpSpPr>
-      <p:grpSpPr>
-        <a:xfrm>
-          <a:off x="0" y="0"/>
-          <a:ext cx="0" cy="0"/>
-          <a:chOff x="0" y="0"/>
-          <a:chExt cx="0" cy="0"/>
-        </a:xfrm>
-      </p:grpSpPr>
-      <p:sp>
-        <p:nvSpPr>
-          <p:cNvPr id="2" name="Title 1"/>
-          <p:cNvSpPr>
-            <a:spLocks noGrp="1"/>
-          </p:cNvSpPr>
-          <p:nvPr>
-            <p:ph type="title"/>
-          </p:nvPr>
-        </p:nvSpPr>
-        <p:spPr/>
-        <p:txBody>
-          <a:bodyPr/>
-          <a:lstStyle/>
-          <a:p>
-            <a:r>
-              <a:rPr lang="en-US" dirty="0" smtClean="0"/>
-              <a:t>Contact Us</a:t>
-            </a:r>
-            <a:endParaRPr lang="en-US" dirty="0"/>
-          </a:p>
-        </p:txBody>
-      </p:sp>
-      <p:sp>
-        <p:nvSpPr>
-          <p:cNvPr id="6" name="Content Placeholder 5"/>
-          <p:cNvSpPr>
-            <a:spLocks noGrp="1"/>
-          </p:cNvSpPr>
-          <p:nvPr>
-            <p:ph sz="half" idx="1"/>
-          </p:nvPr>
-        </p:nvSpPr>
-        <p:spPr>
-          <a:xfrm>
-            <a:off x="457200" y="1600201"/>
-            <a:ext cx="4038600" cy="2057400"/>
-          </a:xfrm>
-        </p:spPr>
-        <p:txBody>
-          <a:bodyPr>
-            <a:normAutofit lnSpcReduction="10000"/>
-          </a:bodyPr>
-          <a:lstStyle/>
-          <a:p>
-            <a:pPr algn="ctr">
-              <a:buNone/>
-            </a:pPr>
-            <a:r>
-              <a:rPr lang="en-US" sz="2400" b="1" dirty="0" smtClean="0"/>
-              <a:t>Jerrel Blankenship</a:t>
-            </a:r>
-          </a:p>
-          <a:p>
-            <a:pPr algn="ctr">
-              <a:buNone/>
-            </a:pPr>
-            <a:r>
-              <a:rPr lang="en-US" sz="2400" dirty="0" smtClean="0"/>
-              <a:t>Jerrel@jerrelblankenship.com</a:t>
-            </a:r>
-          </a:p>
-          <a:p>
-            <a:pPr algn="ctr">
-              <a:buNone/>
-            </a:pPr>
-            <a:r>
-              <a:rPr lang="en-US" sz="2400" dirty="0" smtClean="0"/>
-              <a:t>@TheJerrel</a:t>
-            </a:r>
-          </a:p>
-          <a:p>
-            <a:pPr algn="ctr">
-              <a:buNone/>
-            </a:pPr>
-            <a:r>
-              <a:rPr lang="en-US" sz="2400" dirty="0" smtClean="0"/>
-              <a:t>www.jerrelblankenship.com</a:t>
-            </a:r>
-          </a:p>
-          <a:p>
-            <a:pPr algn="ctr">
-              <a:buNone/>
-            </a:pPr>
-            <a:endParaRPr lang="en-US" dirty="0" smtClean="0"/>
-          </a:p>
-          <a:p>
-            <a:pPr algn="ctr">
-              <a:buNone/>
-            </a:pPr>
-            <a:endParaRPr lang="en-US" dirty="0"/>
-          </a:p>
-        </p:txBody>
-      </p:sp>
-      <p:sp>
-        <p:nvSpPr>
-          <p:cNvPr id="4" name="Content Placeholder 3"/>
-          <p:cNvSpPr>
-            <a:spLocks noGrp="1"/>
-          </p:cNvSpPr>
-          <p:nvPr>
-            <p:ph sz="half" idx="2"/>
-          </p:nvPr>
-        </p:nvSpPr>
-        <p:spPr>
-          <a:xfrm>
-            <a:off x="4648200" y="1600200"/>
-            <a:ext cx="4038600" cy="2057401"/>
-          </a:xfrm>
-        </p:spPr>
-        <p:txBody>
-          <a:bodyPr>
-            <a:normAutofit lnSpcReduction="10000"/>
-          </a:bodyPr>
-          <a:lstStyle/>
-          <a:p>
-            <a:pPr algn="ctr">
-              <a:buNone/>
-            </a:pPr>
-            <a:r>
-              <a:rPr lang="en-US" sz="2400" b="1" dirty="0"/>
-              <a:t>Jamie Dicken</a:t>
-            </a:r>
-          </a:p>
-          <a:p>
-            <a:pPr algn="ctr">
-              <a:buNone/>
-            </a:pPr>
-            <a:r>
-              <a:rPr lang="en-US" sz="2400" dirty="0"/>
-              <a:t>Jamie@dotnetgeekette.com</a:t>
-            </a:r>
-          </a:p>
-          <a:p>
-            <a:pPr algn="ctr">
-              <a:buNone/>
-            </a:pPr>
-            <a:r>
-              <a:rPr lang="en-US" sz="2400" dirty="0"/>
-              <a:t>@DotNetGeekette</a:t>
-            </a:r>
-          </a:p>
-          <a:p>
-            <a:pPr algn="ctr">
-              <a:buNone/>
-            </a:pPr>
-            <a:r>
-              <a:rPr lang="en-US" sz="2400" dirty="0"/>
-              <a:t>www.dotnetgeekette.com</a:t>
-            </a:r>
-          </a:p>
-          <a:p>
-            <a:endParaRPr lang="en-US" dirty="0"/>
-          </a:p>
-        </p:txBody>
-      </p:sp>
-      <p:sp>
-        <p:nvSpPr>
-          <p:cNvPr id="5" name="TextBox 4"/>
-          <p:cNvSpPr txBox="1"/>
-          <p:nvPr/>
-        </p:nvSpPr>
-        <p:spPr>
-          <a:xfrm>
-            <a:off x="2307957" y="4114800"/>
-            <a:ext cx="4528085" cy="1200329"/>
-          </a:xfrm>
-          <a:prstGeom prst="rect">
-            <a:avLst/>
-          </a:prstGeom>
-          <a:noFill/>
-        </p:spPr>
-        <p:txBody>
-          <a:bodyPr wrap="square" rtlCol="0">
-            <a:spAutoFit/>
-          </a:bodyPr>
-          <a:lstStyle/>
-          <a:p>
-            <a:pPr algn="ctr">
-              <a:buNone/>
-            </a:pPr>
-            <a:r>
-              <a:rPr lang="en-US" sz="2400" dirty="0"/>
-              <a:t>Slide Deck Link:</a:t>
-            </a:r>
-          </a:p>
-          <a:p>
-            <a:pPr algn="ctr">
-              <a:buNone/>
-            </a:pPr>
-            <a:r>
-              <a:rPr lang="en-US" sz="2400" dirty="0"/>
-              <a:t>http://bit.ly/16wOVaP</a:t>
-            </a:r>
-          </a:p>
-          <a:p>
-            <a:endParaRPr lang="en-US" sz="2400" dirty="0"/>
-          </a:p>
-        </p:txBody>
-      </p:sp>
-    </p:spTree>
-    <p:extLst>
-      <p:ext uri="{BB962C8B-B14F-4D97-AF65-F5344CB8AC3E}">
-        <p14:creationId xmlns:p14="http://schemas.microsoft.com/office/powerpoint/2010/main" val="4141454704"/>
-      </p:ext>
-    </p:extLst>
-  </p:cSld>
-  <p:clrMapOvr>
-    <a:masterClrMapping/>
-  </p:clrMapOvr>
-  <p:timing>
-    <p:tnLst>
-      <p:par>
-        <p:cTn id="1" dur="indefinite" restart="never" nodeType="tmRoot"/>
-      </p:par>
-    </p:tnLst>
-  </p:timing>
-</p:sld>
-</file>
-
-<file path=ppt/slides/slide17.xml><?xml version="1.0" encoding="utf-8"?>
-<p:sld xmlns:a="http://schemas.openxmlformats.org/drawingml/2006/main" xmlns:r="http://schemas.openxmlformats.org/officeDocument/2006/relationships" xmlns:p="http://schemas.openxmlformats.org/presentationml/2006/main">
-  <p:cSld>
-    <p:spTree>
-      <p:nvGrpSpPr>
-        <p:cNvPr id="1" name=""/>
-        <p:cNvGrpSpPr/>
-        <p:nvPr/>
-      </p:nvGrpSpPr>
-      <p:grpSpPr>
-        <a:xfrm>
-          <a:off x="0" y="0"/>
-          <a:ext cx="0" cy="0"/>
-          <a:chOff x="0" y="0"/>
-          <a:chExt cx="0" cy="0"/>
-        </a:xfrm>
-      </p:grpSpPr>
-      <p:sp>
-        <p:nvSpPr>
-          <p:cNvPr id="2" name="Title 1"/>
-          <p:cNvSpPr>
-            <a:spLocks noGrp="1"/>
-          </p:cNvSpPr>
-          <p:nvPr>
-            <p:ph type="title"/>
-          </p:nvPr>
-        </p:nvSpPr>
-        <p:spPr/>
-        <p:txBody>
-          <a:bodyPr/>
-          <a:lstStyle/>
-          <a:p>
-            <a:r>
-              <a:rPr lang="en-US" dirty="0" smtClean="0"/>
-              <a:t>Image Attributions</a:t>
-            </a:r>
-            <a:endParaRPr lang="en-US" dirty="0"/>
-          </a:p>
-        </p:txBody>
-      </p:sp>
-      <p:sp>
-        <p:nvSpPr>
-          <p:cNvPr id="3" name="Content Placeholder 2"/>
-          <p:cNvSpPr>
-            <a:spLocks noGrp="1"/>
-          </p:cNvSpPr>
-          <p:nvPr>
-            <p:ph idx="1"/>
-          </p:nvPr>
-        </p:nvSpPr>
-        <p:spPr/>
-        <p:txBody>
-          <a:bodyPr/>
-          <a:lstStyle/>
-          <a:p>
-            <a:r>
-              <a:rPr lang="en-US" dirty="0" smtClean="0"/>
-              <a:t>Diagram - </a:t>
-            </a:r>
-            <a:r>
-              <a:rPr lang="en-US" dirty="0" err="1" smtClean="0"/>
-              <a:t>PhoneGap</a:t>
-            </a:r>
-            <a:r>
-              <a:rPr lang="en-US" dirty="0" smtClean="0"/>
-              <a:t> Overview by Adobe / </a:t>
-            </a:r>
-            <a:r>
-              <a:rPr lang="en-US" dirty="0" err="1" smtClean="0"/>
-              <a:t>Yohei</a:t>
-            </a:r>
-            <a:r>
-              <a:rPr lang="en-US" dirty="0" smtClean="0"/>
-              <a:t> </a:t>
-            </a:r>
-            <a:r>
-              <a:rPr lang="en-US" dirty="0" err="1" smtClean="0"/>
-              <a:t>Shimomae</a:t>
-            </a:r>
-            <a:endParaRPr lang="en-US" smtClean="0"/>
-          </a:p>
-          <a:p>
-            <a:r>
-              <a:rPr lang="en-US" smtClean="0"/>
-              <a:t>Smart </a:t>
-            </a:r>
-            <a:r>
-              <a:rPr lang="en-US" dirty="0" smtClean="0"/>
-              <a:t>Phone, Tablet, and PC – The Droid Guy</a:t>
-            </a:r>
-          </a:p>
-          <a:p>
-            <a:pPr>
-              <a:buNone/>
-            </a:pPr>
-            <a:endParaRPr lang="en-US" dirty="0"/>
-          </a:p>
-        </p:txBody>
-      </p:sp>
-    </p:spTree>
-  </p:cSld>
-  <p:clrMapOvr>
-    <a:masterClrMapping/>
-  </p:clrMapOvr>
-  <p:timing>
-    <p:tnLst>
-      <p:par>
-        <p:cTn id="1" dur="indefinite" restart="never" nodeType="tmRoot"/>
-      </p:par>
-    </p:tnLst>
-  </p:timing>
-</p:sld>
-</file>
-
-<file path=ppt/slides/slide18.xml><?xml version="1.0" encoding="utf-8"?>
-<p:sld xmlns:a="http://schemas.openxmlformats.org/drawingml/2006/main" xmlns:r="http://schemas.openxmlformats.org/officeDocument/2006/relationships" xmlns:p="http://schemas.openxmlformats.org/presentationml/2006/main">
-  <p:cSld>
-    <p:spTree>
-      <p:nvGrpSpPr>
-        <p:cNvPr id="1" name=""/>
-        <p:cNvGrpSpPr/>
-        <p:nvPr/>
-      </p:nvGrpSpPr>
-      <p:grpSpPr>
-        <a:xfrm>
-          <a:off x="0" y="0"/>
-          <a:ext cx="0" cy="0"/>
-          <a:chOff x="0" y="0"/>
-          <a:chExt cx="0" cy="0"/>
-        </a:xfrm>
-      </p:grpSpPr>
-      <p:sp>
-        <p:nvSpPr>
-          <p:cNvPr id="2" name="Title 1"/>
-          <p:cNvSpPr>
-            <a:spLocks noGrp="1"/>
-          </p:cNvSpPr>
-          <p:nvPr>
-            <p:ph type="title"/>
-          </p:nvPr>
-        </p:nvSpPr>
-        <p:spPr/>
-        <p:txBody>
-          <a:bodyPr/>
-          <a:lstStyle/>
-          <a:p>
-            <a:r>
-              <a:rPr lang="en-US" dirty="0" smtClean="0"/>
-              <a:t>Xamarin App Comparison</a:t>
-            </a:r>
-            <a:endParaRPr lang="en-US" dirty="0"/>
-          </a:p>
-        </p:txBody>
-      </p:sp>
-      <p:sp>
-        <p:nvSpPr>
-          <p:cNvPr id="4" name="Text Placeholder 3"/>
-          <p:cNvSpPr>
-            <a:spLocks noGrp="1"/>
-          </p:cNvSpPr>
-          <p:nvPr>
-            <p:ph type="body" idx="1"/>
-          </p:nvPr>
-        </p:nvSpPr>
-        <p:spPr/>
-        <p:txBody>
-          <a:bodyPr/>
-          <a:lstStyle/>
-          <a:p>
-            <a:pPr algn="ctr"/>
-            <a:r>
-              <a:rPr lang="en-US" dirty="0" smtClean="0"/>
-              <a:t>Windows Phone 8</a:t>
-            </a:r>
-            <a:endParaRPr lang="en-US" dirty="0"/>
-          </a:p>
-        </p:txBody>
-      </p:sp>
-      <p:pic>
-        <p:nvPicPr>
-          <p:cNvPr id="8" name="Content Placeholder 7"/>
-          <p:cNvPicPr>
-            <a:picLocks noGrp="1" noChangeAspect="1"/>
-          </p:cNvPicPr>
-          <p:nvPr>
-            <p:ph sz="half" idx="2"/>
-          </p:nvPr>
-        </p:nvPicPr>
-        <p:blipFill>
-          <a:blip r:embed="rId2" cstate="print">
-            <a:extLst>
-              <a:ext uri="{28A0092B-C50C-407E-A947-70E740481C1C}">
-                <a14:useLocalDpi xmlns:a14="http://schemas.microsoft.com/office/drawing/2010/main" val="0"/>
-              </a:ext>
-            </a:extLst>
-          </a:blip>
-          <a:stretch>
-            <a:fillRect/>
-          </a:stretch>
-        </p:blipFill>
-        <p:spPr>
-          <a:xfrm>
-            <a:off x="1487488" y="2870200"/>
-            <a:ext cx="1752599" cy="2921000"/>
-          </a:xfrm>
-        </p:spPr>
-      </p:pic>
-      <p:sp>
-        <p:nvSpPr>
-          <p:cNvPr id="6" name="Text Placeholder 5"/>
-          <p:cNvSpPr>
-            <a:spLocks noGrp="1"/>
-          </p:cNvSpPr>
-          <p:nvPr>
-            <p:ph type="body" sz="quarter" idx="3"/>
-          </p:nvPr>
-        </p:nvSpPr>
-        <p:spPr/>
-        <p:txBody>
-          <a:bodyPr/>
-          <a:lstStyle/>
-          <a:p>
-            <a:pPr algn="ctr"/>
-            <a:r>
-              <a:rPr lang="en-US" dirty="0" smtClean="0"/>
-              <a:t>Android</a:t>
-            </a:r>
-            <a:endParaRPr lang="en-US" dirty="0"/>
-          </a:p>
-        </p:txBody>
-      </p:sp>
-      <p:pic>
-        <p:nvPicPr>
-          <p:cNvPr id="9" name="Content Placeholder 8"/>
-          <p:cNvPicPr>
-            <a:picLocks noGrp="1" noChangeAspect="1"/>
-          </p:cNvPicPr>
-          <p:nvPr>
-            <p:ph sz="quarter" idx="4"/>
-          </p:nvPr>
-        </p:nvPicPr>
-        <p:blipFill>
-          <a:blip r:embed="rId3" cstate="print">
-            <a:extLst>
-              <a:ext uri="{28A0092B-C50C-407E-A947-70E740481C1C}">
-                <a14:useLocalDpi xmlns:a14="http://schemas.microsoft.com/office/drawing/2010/main" val="0"/>
-              </a:ext>
-            </a:extLst>
-          </a:blip>
-          <a:stretch>
-            <a:fillRect/>
-          </a:stretch>
-        </p:blipFill>
-        <p:spPr>
-          <a:xfrm>
-            <a:off x="5343757" y="3035187"/>
-            <a:ext cx="1958510" cy="2591025"/>
-          </a:xfrm>
-        </p:spPr>
-      </p:pic>
-    </p:spTree>
-    <p:extLst>
-      <p:ext uri="{BB962C8B-B14F-4D97-AF65-F5344CB8AC3E}">
-        <p14:creationId xmlns:p14="http://schemas.microsoft.com/office/powerpoint/2010/main" val="2878373410"/>
-      </p:ext>
-    </p:extLst>
-  </p:cSld>
-  <p:clrMapOvr>
-    <a:masterClrMapping/>
-  </p:clrMapOvr>
-  <p:timing>
-    <p:tnLst>
-      <p:par>
-        <p:cTn id="1" dur="indefinite" restart="never" nodeType="tmRoot"/>
-      </p:par>
-    </p:tnLst>
-  </p:timing>
-</p:sld>
-</file>
-
-<file path=ppt/slides/slide2.xml><?xml version="1.0" encoding="utf-8"?>
-<p:sld xmlns:a="http://schemas.openxmlformats.org/drawingml/2006/main" xmlns:r="http://schemas.openxmlformats.org/officeDocument/2006/relationships" xmlns:p="http://schemas.openxmlformats.org/presentationml/2006/main">
-  <p:cSld>
-    <p:spTree>
-      <p:nvGrpSpPr>
-        <p:cNvPr id="1" name=""/>
-        <p:cNvGrpSpPr/>
-        <p:nvPr/>
-      </p:nvGrpSpPr>
-      <p:grpSpPr>
-        <a:xfrm>
-          <a:off x="0" y="0"/>
-          <a:ext cx="0" cy="0"/>
-          <a:chOff x="0" y="0"/>
-          <a:chExt cx="0" cy="0"/>
-        </a:xfrm>
-      </p:grpSpPr>
-      <p:sp>
-        <p:nvSpPr>
-          <p:cNvPr id="4" name="Title 3"/>
-          <p:cNvSpPr>
-            <a:spLocks noGrp="1"/>
-          </p:cNvSpPr>
-          <p:nvPr>
-            <p:ph type="title"/>
-          </p:nvPr>
-        </p:nvSpPr>
-        <p:spPr/>
-        <p:txBody>
-          <a:bodyPr/>
-          <a:lstStyle/>
-          <a:p>
-            <a:pPr algn="ctr"/>
-            <a:r>
-              <a:rPr lang="en-US" dirty="0" smtClean="0"/>
-              <a:t>A Little About Myself</a:t>
-            </a:r>
-            <a:endParaRPr lang="en-US" dirty="0"/>
-          </a:p>
-        </p:txBody>
-      </p:sp>
-      <p:sp>
-        <p:nvSpPr>
-          <p:cNvPr id="5" name="Content Placeholder 4"/>
-          <p:cNvSpPr>
-            <a:spLocks noGrp="1"/>
-          </p:cNvSpPr>
-          <p:nvPr>
-            <p:ph sz="half" idx="1"/>
-          </p:nvPr>
-        </p:nvSpPr>
-        <p:spPr>
-          <a:xfrm>
-            <a:off x="1676400" y="1981200"/>
-            <a:ext cx="5638800" cy="3649134"/>
-          </a:xfrm>
-        </p:spPr>
-        <p:txBody>
-          <a:bodyPr>
-            <a:normAutofit/>
-          </a:bodyPr>
-          <a:lstStyle/>
-          <a:p>
-            <a:r>
-              <a:rPr lang="en-US" dirty="0" smtClean="0"/>
-              <a:t>Software </a:t>
-            </a:r>
-            <a:r>
-              <a:rPr lang="en-US" dirty="0"/>
-              <a:t>Engineer at RelayHealth</a:t>
-            </a:r>
-          </a:p>
-          <a:p>
-            <a:r>
-              <a:rPr lang="en-US" dirty="0"/>
-              <a:t>Author: </a:t>
-            </a:r>
-            <a:r>
-              <a:rPr lang="en-US" i="1" dirty="0"/>
-              <a:t>Pro Agile .NET Development with Scrum</a:t>
-            </a:r>
-          </a:p>
-          <a:p>
-            <a:r>
-              <a:rPr lang="en-US" dirty="0"/>
-              <a:t>Striving Software Craftsman</a:t>
-            </a:r>
-          </a:p>
-          <a:p>
-            <a:r>
-              <a:rPr lang="en-US" dirty="0"/>
-              <a:t>Certified Scrum Master</a:t>
-            </a:r>
-          </a:p>
-          <a:p>
-            <a:pPr algn="ctr">
-              <a:buNone/>
-            </a:pPr>
-            <a:endParaRPr lang="en-US" dirty="0"/>
-          </a:p>
-        </p:txBody>
-      </p:sp>
-      <p:sp>
-        <p:nvSpPr>
-          <p:cNvPr id="6" name="Content Placeholder 5"/>
-          <p:cNvSpPr>
-            <a:spLocks noGrp="1"/>
-          </p:cNvSpPr>
-          <p:nvPr>
-            <p:ph sz="half" idx="2"/>
-          </p:nvPr>
-        </p:nvSpPr>
-        <p:spPr>
-          <a:xfrm>
-            <a:off x="9525000" y="1447800"/>
-            <a:ext cx="3813048" cy="3649133"/>
-          </a:xfrm>
-        </p:spPr>
-        <p:txBody>
-          <a:bodyPr>
-            <a:normAutofit/>
-          </a:bodyPr>
-          <a:lstStyle/>
-          <a:p>
-            <a:pPr algn="ctr">
-              <a:buNone/>
-            </a:pPr>
-            <a:endParaRPr lang="en-US" b="1" dirty="0"/>
-          </a:p>
-        </p:txBody>
-      </p:sp>
-    </p:spTree>
-  </p:cSld>
-  <p:clrMapOvr>
-    <a:masterClrMapping/>
-  </p:clrMapOvr>
-  <p:timing>
-    <p:tnLst>
-      <p:par>
-        <p:cTn id="1" dur="indefinite" restart="never" nodeType="tmRoot"/>
-      </p:par>
-    </p:tnLst>
-  </p:timing>
-</p:sld>
-</file>
-
-<file path=ppt/slides/slide3.xml><?xml version="1.0" encoding="utf-8"?>
-<p:sld xmlns:a="http://schemas.openxmlformats.org/drawingml/2006/main" xmlns:r="http://schemas.openxmlformats.org/officeDocument/2006/relationships" xmlns:p="http://schemas.openxmlformats.org/presentationml/2006/main">
-  <p:cSld>
-    <p:spTree>
-      <p:nvGrpSpPr>
-        <p:cNvPr id="1" name=""/>
-        <p:cNvGrpSpPr/>
-        <p:nvPr/>
-      </p:nvGrpSpPr>
-      <p:grpSpPr>
-        <a:xfrm>
-          <a:off x="0" y="0"/>
-          <a:ext cx="0" cy="0"/>
-          <a:chOff x="0" y="0"/>
-          <a:chExt cx="0" cy="0"/>
-        </a:xfrm>
-      </p:grpSpPr>
-      <p:sp>
-        <p:nvSpPr>
-          <p:cNvPr id="2" name="Title 1"/>
-          <p:cNvSpPr>
-            <a:spLocks noGrp="1"/>
-          </p:cNvSpPr>
-          <p:nvPr>
-            <p:ph type="title"/>
-          </p:nvPr>
-        </p:nvSpPr>
-        <p:spPr/>
-        <p:txBody>
-          <a:bodyPr/>
-          <a:lstStyle/>
-          <a:p>
-            <a:r>
-              <a:rPr lang="en-US" dirty="0" smtClean="0"/>
-              <a:t>Which One Do I Choose?</a:t>
-            </a:r>
-            <a:endParaRPr lang="en-US" dirty="0"/>
-          </a:p>
-        </p:txBody>
-      </p:sp>
-      <p:pic>
-        <p:nvPicPr>
-          <p:cNvPr id="4" name="Content Placeholder 3" descr="smartphone-tablet-pc.png"/>
-          <p:cNvPicPr>
-            <a:picLocks noGrp="1" noChangeAspect="1"/>
-          </p:cNvPicPr>
-          <p:nvPr>
-            <p:ph idx="1"/>
-          </p:nvPr>
-        </p:nvPicPr>
-        <p:blipFill>
-          <a:blip r:embed="rId3" cstate="print"/>
-          <a:stretch>
-            <a:fillRect/>
-          </a:stretch>
-        </p:blipFill>
-        <p:spPr>
-          <a:xfrm>
-            <a:off x="1962150" y="2361406"/>
-            <a:ext cx="4762500" cy="3209925"/>
-          </a:xfrm>
-        </p:spPr>
-      </p:pic>
-    </p:spTree>
-  </p:cSld>
-  <p:clrMapOvr>
-    <a:masterClrMapping/>
-  </p:clrMapOvr>
-  <p:timing>
-    <p:tnLst>
-      <p:par>
-        <p:cTn id="1" dur="indefinite" restart="never" nodeType="tmRoot"/>
-      </p:par>
-    </p:tnLst>
-  </p:timing>
-</p:sld>
-</file>
-
-<file path=ppt/slides/slide4.xml><?xml version="1.0" encoding="utf-8"?>
-<p:sld xmlns:a="http://schemas.openxmlformats.org/drawingml/2006/main" xmlns:r="http://schemas.openxmlformats.org/officeDocument/2006/relationships" xmlns:p="http://schemas.openxmlformats.org/presentationml/2006/main">
-  <p:cSld>
-    <p:spTree>
-      <p:nvGrpSpPr>
-        <p:cNvPr id="1" name=""/>
-        <p:cNvGrpSpPr/>
-        <p:nvPr/>
-      </p:nvGrpSpPr>
-      <p:grpSpPr>
-        <a:xfrm>
-          <a:off x="0" y="0"/>
-          <a:ext cx="0" cy="0"/>
-          <a:chOff x="0" y="0"/>
-          <a:chExt cx="0" cy="0"/>
-        </a:xfrm>
-      </p:grpSpPr>
-      <p:sp>
-        <p:nvSpPr>
-          <p:cNvPr id="2" name="Title 1"/>
-          <p:cNvSpPr>
-            <a:spLocks noGrp="1"/>
-          </p:cNvSpPr>
-          <p:nvPr>
-            <p:ph type="title"/>
-          </p:nvPr>
-        </p:nvSpPr>
-        <p:spPr/>
-        <p:txBody>
-          <a:bodyPr/>
-          <a:lstStyle/>
-          <a:p>
-            <a:r>
-              <a:rPr lang="en-US" dirty="0" smtClean="0"/>
-              <a:t>Frameworks To The Rescue</a:t>
-            </a:r>
-            <a:endParaRPr lang="en-US" dirty="0"/>
-          </a:p>
-        </p:txBody>
-      </p:sp>
-      <p:sp>
-        <p:nvSpPr>
-          <p:cNvPr id="3" name="Content Placeholder 2"/>
-          <p:cNvSpPr>
-            <a:spLocks noGrp="1"/>
-          </p:cNvSpPr>
-          <p:nvPr>
-            <p:ph idx="1"/>
-          </p:nvPr>
-        </p:nvSpPr>
-        <p:spPr/>
-        <p:txBody>
-          <a:bodyPr/>
-          <a:lstStyle/>
-          <a:p>
-            <a:pPr algn="ctr">
-              <a:buNone/>
-            </a:pPr>
-            <a:r>
-              <a:rPr lang="en-US" dirty="0" err="1" smtClean="0"/>
-              <a:t>PhoneGap</a:t>
-            </a:r>
-            <a:endParaRPr lang="en-US" dirty="0" smtClean="0"/>
-          </a:p>
-          <a:p>
-            <a:pPr algn="ctr">
-              <a:buNone/>
-            </a:pPr>
-            <a:r>
-              <a:rPr lang="en-US" dirty="0" err="1" smtClean="0"/>
-              <a:t>Xamarin</a:t>
-            </a:r>
-            <a:endParaRPr lang="en-US" dirty="0" smtClean="0"/>
-          </a:p>
-          <a:p>
-            <a:pPr algn="ctr">
-              <a:buNone/>
-            </a:pPr>
-            <a:r>
-              <a:rPr lang="en-US" dirty="0" err="1" smtClean="0"/>
-              <a:t>AppMobi</a:t>
-            </a:r>
-            <a:endParaRPr lang="en-US" dirty="0" smtClean="0"/>
-          </a:p>
-          <a:p>
-            <a:pPr algn="ctr">
-              <a:buNone/>
-            </a:pPr>
-            <a:r>
-              <a:rPr lang="en-US" dirty="0" smtClean="0"/>
-              <a:t>Unity</a:t>
-            </a:r>
-          </a:p>
-          <a:p>
-            <a:pPr algn="ctr">
-              <a:buNone/>
-            </a:pPr>
-            <a:r>
-              <a:rPr lang="en-US" dirty="0" err="1" smtClean="0"/>
-              <a:t>Appcelerator</a:t>
-            </a:r>
-            <a:endParaRPr lang="en-US" dirty="0" smtClean="0"/>
-          </a:p>
-          <a:p>
-            <a:pPr algn="ctr">
-              <a:buNone/>
-            </a:pPr>
-            <a:r>
-              <a:rPr lang="en-US" dirty="0" smtClean="0"/>
-              <a:t>Adobe Flex</a:t>
-            </a:r>
-          </a:p>
-          <a:p>
-            <a:pPr algn="ctr">
-              <a:buNone/>
-            </a:pPr>
-            <a:endParaRPr lang="en-US" dirty="0"/>
-          </a:p>
-        </p:txBody>
-      </p:sp>
-    </p:spTree>
-    <p:extLst>
-      <p:ext uri="{BB962C8B-B14F-4D97-AF65-F5344CB8AC3E}">
-        <p14:creationId xmlns:p14="http://schemas.microsoft.com/office/powerpoint/2010/main" val="1918943846"/>
-      </p:ext>
-    </p:extLst>
-  </p:cSld>
-  <p:clrMapOvr>
-    <a:masterClrMapping/>
-  </p:clrMapOvr>
-  <p:timing>
-    <p:tnLst>
-      <p:par>
-        <p:cTn id="1" dur="indefinite" restart="never" nodeType="tmRoot"/>
-      </p:par>
-    </p:tnLst>
-  </p:timing>
-</p:sld>
-</file>
-
-<file path=ppt/slides/slide5.xml><?xml version="1.0" encoding="utf-8"?>
-<p:sld xmlns:a="http://schemas.openxmlformats.org/drawingml/2006/main" xmlns:r="http://schemas.openxmlformats.org/officeDocument/2006/relationships" xmlns:p="http://schemas.openxmlformats.org/presentationml/2006/main">
-  <p:cSld>
-    <p:spTree>
-      <p:nvGrpSpPr>
-        <p:cNvPr id="1" name=""/>
-        <p:cNvGrpSpPr/>
-        <p:nvPr/>
-      </p:nvGrpSpPr>
-      <p:grpSpPr>
-        <a:xfrm>
-          <a:off x="0" y="0"/>
-          <a:ext cx="0" cy="0"/>
-          <a:chOff x="0" y="0"/>
-          <a:chExt cx="0" cy="0"/>
-        </a:xfrm>
-      </p:grpSpPr>
-      <p:sp>
-        <p:nvSpPr>
-          <p:cNvPr id="4" name="Title 3"/>
-          <p:cNvSpPr>
-            <a:spLocks noGrp="1"/>
-          </p:cNvSpPr>
-          <p:nvPr>
-            <p:ph type="ctrTitle"/>
-          </p:nvPr>
-        </p:nvSpPr>
-        <p:spPr/>
-        <p:txBody>
-          <a:bodyPr>
-            <a:normAutofit/>
-          </a:bodyPr>
-          <a:lstStyle/>
-          <a:p>
-            <a:r>
-              <a:rPr lang="en-US" sz="6600" dirty="0" err="1" smtClean="0"/>
-              <a:t>PhoneGap</a:t>
-            </a:r>
-            <a:endParaRPr lang="en-US" sz="6600" dirty="0"/>
-          </a:p>
-        </p:txBody>
-      </p:sp>
-    </p:spTree>
-  </p:cSld>
-  <p:clrMapOvr>
-    <a:masterClrMapping/>
-  </p:clrMapOvr>
-  <p:timing>
-    <p:tnLst>
-      <p:par>
-        <p:cTn id="1" dur="indefinite" restart="never" nodeType="tmRoot"/>
-      </p:par>
-    </p:tnLst>
-  </p:timing>
-</p:sld>
-</file>
-
-<file path=ppt/slides/slide6.xml><?xml version="1.0" encoding="utf-8"?>
-<p:sld xmlns:a="http://schemas.openxmlformats.org/drawingml/2006/main" xmlns:r="http://schemas.openxmlformats.org/officeDocument/2006/relationships" xmlns:p="http://schemas.openxmlformats.org/presentationml/2006/main">
-  <p:cSld>
-    <p:spTree>
-      <p:nvGrpSpPr>
-        <p:cNvPr id="1" name=""/>
-        <p:cNvGrpSpPr/>
-        <p:nvPr/>
-      </p:nvGrpSpPr>
-      <p:grpSpPr>
-        <a:xfrm>
-          <a:off x="0" y="0"/>
-          <a:ext cx="0" cy="0"/>
-          <a:chOff x="0" y="0"/>
-          <a:chExt cx="0" cy="0"/>
-        </a:xfrm>
-      </p:grpSpPr>
-      <p:sp>
-        <p:nvSpPr>
-          <p:cNvPr id="2" name="Title 1"/>
-          <p:cNvSpPr>
-            <a:spLocks noGrp="1"/>
-          </p:cNvSpPr>
-          <p:nvPr>
-            <p:ph type="title"/>
-          </p:nvPr>
-        </p:nvSpPr>
-        <p:spPr/>
-        <p:txBody>
-          <a:bodyPr/>
-          <a:lstStyle/>
-          <a:p>
-            <a:r>
-              <a:rPr lang="en-US" dirty="0" smtClean="0"/>
-              <a:t>What Is </a:t>
-            </a:r>
-            <a:r>
-              <a:rPr lang="en-US" dirty="0" err="1" smtClean="0"/>
-              <a:t>PhoneGap</a:t>
-            </a:r>
-            <a:r>
-              <a:rPr lang="en-US" dirty="0" smtClean="0"/>
-              <a:t>?</a:t>
-            </a:r>
-            <a:endParaRPr lang="en-US" dirty="0"/>
-          </a:p>
-        </p:txBody>
-      </p:sp>
-      <p:sp>
-        <p:nvSpPr>
-          <p:cNvPr id="3" name="Content Placeholder 2"/>
-          <p:cNvSpPr>
-            <a:spLocks noGrp="1"/>
-          </p:cNvSpPr>
-          <p:nvPr>
-            <p:ph idx="1"/>
-          </p:nvPr>
-        </p:nvSpPr>
-        <p:spPr/>
-        <p:txBody>
-          <a:bodyPr/>
-          <a:lstStyle/>
-          <a:p>
-            <a:r>
-              <a:rPr lang="en-US" dirty="0" smtClean="0"/>
-              <a:t>Open-source</a:t>
-            </a:r>
-          </a:p>
-          <a:p>
-            <a:r>
-              <a:rPr lang="en-US" dirty="0" smtClean="0"/>
-              <a:t>Single codebase</a:t>
-            </a:r>
-          </a:p>
-          <a:p>
-            <a:r>
-              <a:rPr lang="en-US" dirty="0" smtClean="0"/>
-              <a:t>Support for </a:t>
-            </a:r>
-            <a:r>
-              <a:rPr lang="en-US" dirty="0" err="1" smtClean="0"/>
-              <a:t>iOS</a:t>
-            </a:r>
-            <a:r>
-              <a:rPr lang="en-US" dirty="0" smtClean="0"/>
-              <a:t>, Android, Windows Phone, Blackberry, </a:t>
-            </a:r>
-            <a:r>
-              <a:rPr lang="en-US" dirty="0" err="1" smtClean="0"/>
-              <a:t>webOS</a:t>
-            </a:r>
-            <a:endParaRPr lang="en-US" dirty="0" smtClean="0"/>
-          </a:p>
-        </p:txBody>
-      </p:sp>
-    </p:spTree>
-  </p:cSld>
-  <p:clrMapOvr>
-    <a:masterClrMapping/>
-  </p:clrMapOvr>
-  <p:timing>
-    <p:tnLst>
-      <p:par>
-        <p:cTn id="1" dur="indefinite" restart="never" nodeType="tmRoot"/>
-      </p:par>
-    </p:tnLst>
-  </p:timing>
-</p:sld>
-</file>
-
-<file path=ppt/slides/slide7.xml><?xml version="1.0" encoding="utf-8"?>
-<p:sld xmlns:a="http://schemas.openxmlformats.org/drawingml/2006/main" xmlns:r="http://schemas.openxmlformats.org/officeDocument/2006/relationships" xmlns:p="http://schemas.openxmlformats.org/presentationml/2006/main">
-  <p:cSld>
-    <p:spTree>
-      <p:nvGrpSpPr>
-        <p:cNvPr id="1" name=""/>
-        <p:cNvGrpSpPr/>
-        <p:nvPr/>
-      </p:nvGrpSpPr>
-      <p:grpSpPr>
-        <a:xfrm>
-          <a:off x="0" y="0"/>
-          <a:ext cx="0" cy="0"/>
-          <a:chOff x="0" y="0"/>
-          <a:chExt cx="0" cy="0"/>
-        </a:xfrm>
-      </p:grpSpPr>
-      <p:sp>
-        <p:nvSpPr>
-          <p:cNvPr id="2" name="Title 1"/>
-          <p:cNvSpPr>
-            <a:spLocks noGrp="1"/>
-          </p:cNvSpPr>
-          <p:nvPr>
-            <p:ph type="title"/>
-          </p:nvPr>
-        </p:nvSpPr>
-        <p:spPr/>
-        <p:txBody>
-          <a:bodyPr/>
-          <a:lstStyle/>
-          <a:p>
-            <a:r>
-              <a:rPr lang="en-US" dirty="0" err="1" smtClean="0"/>
-              <a:t>PhoneGap</a:t>
-            </a:r>
-            <a:r>
-              <a:rPr lang="en-US" dirty="0" smtClean="0"/>
-              <a:t> Overview</a:t>
-            </a:r>
-            <a:endParaRPr lang="en-US" dirty="0"/>
-          </a:p>
-        </p:txBody>
-      </p:sp>
-      <p:pic>
-        <p:nvPicPr>
-          <p:cNvPr id="4" name="Content Placeholder 3" descr="PhoneGap Build-Diagram-2.png"/>
-          <p:cNvPicPr>
-            <a:picLocks noGrp="1" noChangeAspect="1"/>
-          </p:cNvPicPr>
-          <p:nvPr>
-            <p:ph idx="1"/>
-          </p:nvPr>
-        </p:nvPicPr>
-        <p:blipFill>
-          <a:blip r:embed="rId3" cstate="print"/>
-          <a:stretch>
-            <a:fillRect/>
-          </a:stretch>
-        </p:blipFill>
-        <p:spPr>
-          <a:xfrm>
-            <a:off x="1911083" y="2141538"/>
-            <a:ext cx="4864634" cy="3649662"/>
-          </a:xfrm>
-        </p:spPr>
-      </p:pic>
-    </p:spTree>
-  </p:cSld>
-  <p:clrMapOvr>
-    <a:masterClrMapping/>
-  </p:clrMapOvr>
-  <p:timing>
-    <p:tnLst>
-      <p:par>
-        <p:cTn id="1" dur="indefinite" restart="never" nodeType="tmRoot"/>
-      </p:par>
-    </p:tnLst>
-  </p:timing>
-</p:sld>
-</file>
-
-<file path=ppt/slides/slide8.xml><?xml version="1.0" encoding="utf-8"?>
-<p:sld xmlns:a="http://schemas.openxmlformats.org/drawingml/2006/main" xmlns:r="http://schemas.openxmlformats.org/officeDocument/2006/relationships" xmlns:p="http://schemas.openxmlformats.org/presentationml/2006/main">
-  <p:cSld>
-    <p:spTree>
-      <p:nvGrpSpPr>
-        <p:cNvPr id="1" name=""/>
-        <p:cNvGrpSpPr/>
-        <p:nvPr/>
-      </p:nvGrpSpPr>
-      <p:grpSpPr>
-        <a:xfrm>
-          <a:off x="0" y="0"/>
-          <a:ext cx="0" cy="0"/>
-          <a:chOff x="0" y="0"/>
-          <a:chExt cx="0" cy="0"/>
-        </a:xfrm>
-      </p:grpSpPr>
-      <p:sp>
-        <p:nvSpPr>
-          <p:cNvPr id="6" name="Title 5"/>
-          <p:cNvSpPr>
-            <a:spLocks noGrp="1"/>
-          </p:cNvSpPr>
-          <p:nvPr>
-            <p:ph type="ctrTitle"/>
-          </p:nvPr>
-        </p:nvSpPr>
-        <p:spPr/>
-        <p:txBody>
-          <a:bodyPr>
-            <a:normAutofit/>
-          </a:bodyPr>
-          <a:lstStyle/>
-          <a:p>
-            <a:r>
-              <a:rPr lang="en-US" sz="6600" dirty="0" smtClean="0"/>
-              <a:t>Let’s Create an App!</a:t>
-            </a:r>
-            <a:endParaRPr lang="en-US" sz="6600" dirty="0"/>
-          </a:p>
-        </p:txBody>
-      </p:sp>
-    </p:spTree>
-  </p:cSld>
-  <p:clrMapOvr>
-    <a:masterClrMapping/>
-  </p:clrMapOvr>
-  <p:timing>
-    <p:tnLst>
-      <p:par>
-        <p:cTn id="1" dur="indefinite" restart="never" nodeType="tmRoot"/>
-      </p:par>
-    </p:tnLst>
-  </p:timing>
-</p:sld>
-</file>
-
-<file path=ppt/slides/slide9.xml><?xml version="1.0" encoding="utf-8"?>
-<p:sld xmlns:a="http://schemas.openxmlformats.org/drawingml/2006/main" xmlns:r="http://schemas.openxmlformats.org/officeDocument/2006/relationships" xmlns:p="http://schemas.openxmlformats.org/presentationml/2006/main">
-  <p:cSld>
-    <p:spTree>
-      <p:nvGrpSpPr>
-        <p:cNvPr id="1" name=""/>
-        <p:cNvGrpSpPr/>
-        <p:nvPr/>
-      </p:nvGrpSpPr>
-      <p:grpSpPr>
-        <a:xfrm>
-          <a:off x="0" y="0"/>
-          <a:ext cx="0" cy="0"/>
-          <a:chOff x="0" y="0"/>
-          <a:chExt cx="0" cy="0"/>
-        </a:xfrm>
-      </p:grpSpPr>
-      <p:sp>
-        <p:nvSpPr>
-          <p:cNvPr id="4" name="Title 3"/>
-          <p:cNvSpPr>
-            <a:spLocks noGrp="1"/>
-          </p:cNvSpPr>
-          <p:nvPr>
-            <p:ph type="ctrTitle"/>
-          </p:nvPr>
-        </p:nvSpPr>
-        <p:spPr/>
-        <p:txBody>
-          <a:bodyPr>
-            <a:normAutofit/>
-          </a:bodyPr>
-          <a:lstStyle/>
-          <a:p>
-            <a:r>
-              <a:rPr lang="en-US" sz="6600" dirty="0" err="1" smtClean="0"/>
-              <a:t>Xamarin</a:t>
-            </a:r>
-            <a:endParaRPr lang="en-US" sz="6600" dirty="0"/>
-          </a:p>
-        </p:txBody>
-      </p:sp>
-    </p:spTree>
-  </p:cSld>
-  <p:clrMapOvr>
-    <a:masterClrMapping/>
-  </p:clrMapOvr>
-  <p:timing>
-    <p:tnLst>
-      <p:par>
-        <p:cTn id="1" dur="indefinite" restart="never" nodeType="tmRoot"/>
       </p:par>
     </p:tnLst>
   </p:timing>
@@ -10321,4 +10148,265 @@
   <a:objectDefaults/>
   <a:extraClrSchemeLst/>
 </a:theme>
+</file>
+
+<file path=ppt/theme/theme3.xml><?xml version="1.0" encoding="utf-8"?>
+<a:theme xmlns:a="http://schemas.openxmlformats.org/drawingml/2006/main" name="Office Theme">
+  <a:themeElements>
+    <a:clrScheme name="Office">
+      <a:dk1>
+        <a:sysClr val="windowText" lastClr="000000"/>
+      </a:dk1>
+      <a:lt1>
+        <a:sysClr val="window" lastClr="FFFFFF"/>
+      </a:lt1>
+      <a:dk2>
+        <a:srgbClr val="44546A"/>
+      </a:dk2>
+      <a:lt2>
+        <a:srgbClr val="E7E6E6"/>
+      </a:lt2>
+      <a:accent1>
+        <a:srgbClr val="5B9BD5"/>
+      </a:accent1>
+      <a:accent2>
+        <a:srgbClr val="ED7D31"/>
+      </a:accent2>
+      <a:accent3>
+        <a:srgbClr val="A5A5A5"/>
+      </a:accent3>
+      <a:accent4>
+        <a:srgbClr val="FFC000"/>
+      </a:accent4>
+      <a:accent5>
+        <a:srgbClr val="4472C4"/>
+      </a:accent5>
+      <a:accent6>
+        <a:srgbClr val="70AD47"/>
+      </a:accent6>
+      <a:hlink>
+        <a:srgbClr val="0563C1"/>
+      </a:hlink>
+      <a:folHlink>
+        <a:srgbClr val="954F72"/>
+      </a:folHlink>
+    </a:clrScheme>
+    <a:fontScheme name="Office">
+      <a:majorFont>
+        <a:latin typeface="Calibri Light" panose="020F0302020204030204"/>
+        <a:ea typeface=""/>
+        <a:cs typeface=""/>
+        <a:font script="Jpan" typeface="ＭＳ Ｐゴシック"/>
+        <a:font script="Hang" typeface="맑은 고딕"/>
+        <a:font script="Hans" typeface="宋体"/>
+        <a:font script="Hant" typeface="新細明體"/>
+        <a:font script="Arab" typeface="Times New Roman"/>
+        <a:font script="Hebr" typeface="Times New Roman"/>
+        <a:font script="Thai" typeface="Angsana New"/>
+        <a:font script="Ethi" typeface="Nyala"/>
+        <a:font script="Beng" typeface="Vrinda"/>
+        <a:font script="Gujr" typeface="Shruti"/>
+        <a:font script="Khmr" typeface="MoolBoran"/>
+        <a:font script="Knda" typeface="Tunga"/>
+        <a:font script="Guru" typeface="Raavi"/>
+        <a:font script="Cans" typeface="Euphemia"/>
+        <a:font script="Cher" typeface="Plantagenet Cherokee"/>
+        <a:font script="Yiii" typeface="Microsoft Yi Baiti"/>
+        <a:font script="Tibt" typeface="Microsoft Himalaya"/>
+        <a:font script="Thaa" typeface="MV Boli"/>
+        <a:font script="Deva" typeface="Mangal"/>
+        <a:font script="Telu" typeface="Gautami"/>
+        <a:font script="Taml" typeface="Latha"/>
+        <a:font script="Syrc" typeface="Estrangelo Edessa"/>
+        <a:font script="Orya" typeface="Kalinga"/>
+        <a:font script="Mlym" typeface="Kartika"/>
+        <a:font script="Laoo" typeface="DokChampa"/>
+        <a:font script="Sinh" typeface="Iskoola Pota"/>
+        <a:font script="Mong" typeface="Mongolian Baiti"/>
+        <a:font script="Viet" typeface="Times New Roman"/>
+        <a:font script="Uigh" typeface="Microsoft Uighur"/>
+        <a:font script="Geor" typeface="Sylfaen"/>
+      </a:majorFont>
+      <a:minorFont>
+        <a:latin typeface="Calibri" panose="020F0502020204030204"/>
+        <a:ea typeface=""/>
+        <a:cs typeface=""/>
+        <a:font script="Jpan" typeface="ＭＳ Ｐゴシック"/>
+        <a:font script="Hang" typeface="맑은 고딕"/>
+        <a:font script="Hans" typeface="宋体"/>
+        <a:font script="Hant" typeface="新細明體"/>
+        <a:font script="Arab" typeface="Arial"/>
+        <a:font script="Hebr" typeface="Arial"/>
+        <a:font script="Thai" typeface="Cordia New"/>
+        <a:font script="Ethi" typeface="Nyala"/>
+        <a:font script="Beng" typeface="Vrinda"/>
+        <a:font script="Gujr" typeface="Shruti"/>
+        <a:font script="Khmr" typeface="DaunPenh"/>
+        <a:font script="Knda" typeface="Tunga"/>
+        <a:font script="Guru" typeface="Raavi"/>
+        <a:font script="Cans" typeface="Euphemia"/>
+        <a:font script="Cher" typeface="Plantagenet Cherokee"/>
+        <a:font script="Yiii" typeface="Microsoft Yi Baiti"/>
+        <a:font script="Tibt" typeface="Microsoft Himalaya"/>
+        <a:font script="Thaa" typeface="MV Boli"/>
+        <a:font script="Deva" typeface="Mangal"/>
+        <a:font script="Telu" typeface="Gautami"/>
+        <a:font script="Taml" typeface="Latha"/>
+        <a:font script="Syrc" typeface="Estrangelo Edessa"/>
+        <a:font script="Orya" typeface="Kalinga"/>
+        <a:font script="Mlym" typeface="Kartika"/>
+        <a:font script="Laoo" typeface="DokChampa"/>
+        <a:font script="Sinh" typeface="Iskoola Pota"/>
+        <a:font script="Mong" typeface="Mongolian Baiti"/>
+        <a:font script="Viet" typeface="Arial"/>
+        <a:font script="Uigh" typeface="Microsoft Uighur"/>
+        <a:font script="Geor" typeface="Sylfaen"/>
+      </a:minorFont>
+    </a:fontScheme>
+    <a:fmtScheme name="Office">
+      <a:fillStyleLst>
+        <a:solidFill>
+          <a:schemeClr val="phClr"/>
+        </a:solidFill>
+        <a:gradFill rotWithShape="1">
+          <a:gsLst>
+            <a:gs pos="0">
+              <a:schemeClr val="phClr">
+                <a:lumMod val="110000"/>
+                <a:satMod val="105000"/>
+                <a:tint val="67000"/>
+              </a:schemeClr>
+            </a:gs>
+            <a:gs pos="50000">
+              <a:schemeClr val="phClr">
+                <a:lumMod val="105000"/>
+                <a:satMod val="103000"/>
+                <a:tint val="73000"/>
+              </a:schemeClr>
+            </a:gs>
+            <a:gs pos="100000">
+              <a:schemeClr val="phClr">
+                <a:lumMod val="105000"/>
+                <a:satMod val="109000"/>
+                <a:tint val="81000"/>
+              </a:schemeClr>
+            </a:gs>
+          </a:gsLst>
+          <a:lin ang="5400000" scaled="0"/>
+        </a:gradFill>
+        <a:gradFill rotWithShape="1">
+          <a:gsLst>
+            <a:gs pos="0">
+              <a:schemeClr val="phClr">
+                <a:satMod val="103000"/>
+                <a:lumMod val="102000"/>
+                <a:tint val="94000"/>
+              </a:schemeClr>
+            </a:gs>
+            <a:gs pos="50000">
+              <a:schemeClr val="phClr">
+                <a:satMod val="110000"/>
+                <a:lumMod val="100000"/>
+                <a:shade val="100000"/>
+              </a:schemeClr>
+            </a:gs>
+            <a:gs pos="100000">
+              <a:schemeClr val="phClr">
+                <a:lumMod val="99000"/>
+                <a:satMod val="120000"/>
+                <a:shade val="78000"/>
+              </a:schemeClr>
+            </a:gs>
+          </a:gsLst>
+          <a:lin ang="5400000" scaled="0"/>
+        </a:gradFill>
+      </a:fillStyleLst>
+      <a:lnStyleLst>
+        <a:ln w="6350" cap="flat" cmpd="sng" algn="ctr">
+          <a:solidFill>
+            <a:schemeClr val="phClr"/>
+          </a:solidFill>
+          <a:prstDash val="solid"/>
+          <a:miter lim="800000"/>
+        </a:ln>
+        <a:ln w="12700" cap="flat" cmpd="sng" algn="ctr">
+          <a:solidFill>
+            <a:schemeClr val="phClr"/>
+          </a:solidFill>
+          <a:prstDash val="solid"/>
+          <a:miter lim="800000"/>
+        </a:ln>
+        <a:ln w="19050" cap="flat" cmpd="sng" algn="ctr">
+          <a:solidFill>
+            <a:schemeClr val="phClr"/>
+          </a:solidFill>
+          <a:prstDash val="solid"/>
+          <a:miter lim="800000"/>
+        </a:ln>
+      </a:lnStyleLst>
+      <a:effectStyleLst>
+        <a:effectStyle>
+          <a:effectLst/>
+        </a:effectStyle>
+        <a:effectStyle>
+          <a:effectLst/>
+        </a:effectStyle>
+        <a:effectStyle>
+          <a:effectLst>
+            <a:outerShdw blurRad="57150" dist="19050" dir="5400000" algn="ctr" rotWithShape="0">
+              <a:srgbClr val="000000">
+                <a:alpha val="63000"/>
+              </a:srgbClr>
+            </a:outerShdw>
+          </a:effectLst>
+        </a:effectStyle>
+      </a:effectStyleLst>
+      <a:bgFillStyleLst>
+        <a:solidFill>
+          <a:schemeClr val="phClr"/>
+        </a:solidFill>
+        <a:solidFill>
+          <a:schemeClr val="phClr">
+            <a:tint val="95000"/>
+            <a:satMod val="170000"/>
+          </a:schemeClr>
+        </a:solidFill>
+        <a:gradFill rotWithShape="1">
+          <a:gsLst>
+            <a:gs pos="0">
+              <a:schemeClr val="phClr">
+                <a:tint val="93000"/>
+                <a:satMod val="150000"/>
+                <a:shade val="98000"/>
+                <a:lumMod val="102000"/>
+              </a:schemeClr>
+            </a:gs>
+            <a:gs pos="50000">
+              <a:schemeClr val="phClr">
+                <a:tint val="98000"/>
+                <a:satMod val="130000"/>
+                <a:shade val="90000"/>
+                <a:lumMod val="103000"/>
+              </a:schemeClr>
+            </a:gs>
+            <a:gs pos="100000">
+              <a:schemeClr val="phClr">
+                <a:shade val="63000"/>
+                <a:satMod val="120000"/>
+              </a:schemeClr>
+            </a:gs>
+          </a:gsLst>
+          <a:lin ang="5400000" scaled="0"/>
+        </a:gradFill>
+      </a:bgFillStyleLst>
+    </a:fmtScheme>
+  </a:themeElements>
+  <a:objectDefaults/>
+  <a:extraClrSchemeLst/>
+  <a:extLst>
+    <a:ext uri="{05A4C25C-085E-4340-85A3-A5531E510DB2}">
+      <thm15:themeFamily xmlns:thm15="http://schemas.microsoft.com/office/thememl/2012/main" name="Office Theme" id="{62F939B6-93AF-4DB8-9C6B-D6C7DFDC589F}" vid="{4A3C46E8-61CC-4603-A589-7422A47A8E4A}"/>
+    </a:ext>
+  </a:extLst>
+</a:theme>
 </file>
</xml_diff>